<commit_message>
Further updates to presentation
</commit_message>
<xml_diff>
--- a/assets/documentation/FilmBank Presentation.pptx
+++ b/assets/documentation/FilmBank Presentation.pptx
@@ -19,6 +19,7 @@
     <p:sldId id="264" r:id="rId15"/>
     <p:sldId id="265" r:id="rId16"/>
     <p:sldId id="266" r:id="rId17"/>
+    <p:sldId id="267" r:id="rId18"/>
   </p:sldIdLst>
   <p:sldSz cy="5143500" cx="9144000"/>
   <p:notesSz cx="6858000" cy="9144000"/>
@@ -800,7 +801,7 @@
   <p:cSld>
     <p:spTree>
       <p:nvGrpSpPr>
-        <p:cNvPr id="115" name="Shape 115"/>
+        <p:cNvPr id="114" name="Shape 114"/>
         <p:cNvGrpSpPr/>
         <p:nvPr/>
       </p:nvGrpSpPr>
@@ -814,7 +815,7 @@
       </p:grpSpPr>
       <p:sp>
         <p:nvSpPr>
-          <p:cNvPr id="116" name="Google Shape;116;gcf12c87b13_0_100:notes"/>
+          <p:cNvPr id="115" name="Google Shape;115;gcf12c87b13_0_93:notes"/>
           <p:cNvSpPr/>
           <p:nvPr>
             <p:ph idx="2" type="sldImg"/>
@@ -849,7 +850,7 @@
       </p:sp>
       <p:sp>
         <p:nvSpPr>
-          <p:cNvPr id="117" name="Google Shape;117;gcf12c87b13_0_100:notes"/>
+          <p:cNvPr id="116" name="Google Shape;116;gcf12c87b13_0_93:notes"/>
           <p:cNvSpPr txBox="1"/>
           <p:nvPr>
             <p:ph idx="1" type="body"/>
@@ -899,7 +900,7 @@
   <p:cSld>
     <p:spTree>
       <p:nvGrpSpPr>
-        <p:cNvPr id="124" name="Shape 124"/>
+        <p:cNvPr id="122" name="Shape 122"/>
         <p:cNvGrpSpPr/>
         <p:nvPr/>
       </p:nvGrpSpPr>
@@ -913,7 +914,7 @@
       </p:grpSpPr>
       <p:sp>
         <p:nvSpPr>
-          <p:cNvPr id="125" name="Google Shape;125;gcf12c87b13_0_113:notes"/>
+          <p:cNvPr id="123" name="Google Shape;123;gcf12c87b13_0_100:notes"/>
           <p:cNvSpPr/>
           <p:nvPr>
             <p:ph idx="2" type="sldImg"/>
@@ -948,7 +949,106 @@
       </p:sp>
       <p:sp>
         <p:nvSpPr>
-          <p:cNvPr id="126" name="Google Shape;126;gcf12c87b13_0_113:notes"/>
+          <p:cNvPr id="124" name="Google Shape;124;gcf12c87b13_0_100:notes"/>
+          <p:cNvSpPr txBox="1"/>
+          <p:nvPr>
+            <p:ph idx="1" type="body"/>
+          </p:nvPr>
+        </p:nvSpPr>
+        <p:spPr>
+          <a:xfrm>
+            <a:off x="685800" y="4343400"/>
+            <a:ext cx="5486400" cy="4114800"/>
+          </a:xfrm>
+          <a:prstGeom prst="rect">
+            <a:avLst/>
+          </a:prstGeom>
+        </p:spPr>
+        <p:txBody>
+          <a:bodyPr anchorCtr="0" anchor="t" bIns="91425" lIns="91425" spcFirstLastPara="1" rIns="91425" wrap="square" tIns="91425">
+            <a:noAutofit/>
+          </a:bodyPr>
+          <a:lstStyle/>
+          <a:p>
+            <a:pPr indent="0" lvl="0" marL="0" rtl="0" algn="l">
+              <a:spcBef>
+                <a:spcPts val="0"/>
+              </a:spcBef>
+              <a:spcAft>
+                <a:spcPts val="0"/>
+              </a:spcAft>
+              <a:buNone/>
+            </a:pPr>
+            <a:r>
+              <a:t/>
+            </a:r>
+            <a:endParaRPr/>
+          </a:p>
+        </p:txBody>
+      </p:sp>
+    </p:spTree>
+  </p:cSld>
+  <p:clrMapOvr>
+    <a:masterClrMapping/>
+  </p:clrMapOvr>
+</p:notes>
+</file>
+
+<file path=ppt/notesSlides/notesSlide12.xml><?xml version="1.0" encoding="utf-8"?>
+<p:notes xmlns:a="http://schemas.openxmlformats.org/drawingml/2006/main" xmlns:r="http://schemas.openxmlformats.org/officeDocument/2006/relationships" xmlns:mc="http://schemas.openxmlformats.org/markup-compatibility/2006" xmlns:mv="urn:schemas-microsoft-com:mac:vml" xmlns:p="http://schemas.openxmlformats.org/presentationml/2006/main" xmlns:c="http://schemas.openxmlformats.org/drawingml/2006/chart" xmlns:dgm="http://schemas.openxmlformats.org/drawingml/2006/diagram" xmlns:o="urn:schemas-microsoft-com:office:office" xmlns:v="urn:schemas-microsoft-com:vml" xmlns:pvml="urn:schemas-microsoft-com:office:powerpoint" xmlns:com="http://schemas.openxmlformats.org/drawingml/2006/compatibility" xmlns:p14="http://schemas.microsoft.com/office/powerpoint/2010/main" xmlns:p15="http://schemas.microsoft.com/office/powerpoint/2012/main" xmlns:ahyp="http://schemas.microsoft.com/office/drawing/2018/hyperlinkcolor" showMasterPhAnim="0" showMasterSp="0">
+  <p:cSld>
+    <p:spTree>
+      <p:nvGrpSpPr>
+        <p:cNvPr id="131" name="Shape 131"/>
+        <p:cNvGrpSpPr/>
+        <p:nvPr/>
+      </p:nvGrpSpPr>
+      <p:grpSpPr>
+        <a:xfrm>
+          <a:off x="0" y="0"/>
+          <a:ext cx="0" cy="0"/>
+          <a:chOff x="0" y="0"/>
+          <a:chExt cx="0" cy="0"/>
+        </a:xfrm>
+      </p:grpSpPr>
+      <p:sp>
+        <p:nvSpPr>
+          <p:cNvPr id="132" name="Google Shape;132;gcf12c87b13_0_113:notes"/>
+          <p:cNvSpPr/>
+          <p:nvPr>
+            <p:ph idx="2" type="sldImg"/>
+          </p:nvPr>
+        </p:nvSpPr>
+        <p:spPr>
+          <a:xfrm>
+            <a:off x="381300" y="685800"/>
+            <a:ext cx="6096000" cy="3429000"/>
+          </a:xfrm>
+          <a:custGeom>
+            <a:rect b="b" l="l" r="r" t="t"/>
+            <a:pathLst>
+              <a:path extrusionOk="0" h="120000" w="120000">
+                <a:moveTo>
+                  <a:pt x="0" y="0"/>
+                </a:moveTo>
+                <a:lnTo>
+                  <a:pt x="120000" y="0"/>
+                </a:lnTo>
+                <a:lnTo>
+                  <a:pt x="120000" y="120000"/>
+                </a:lnTo>
+                <a:lnTo>
+                  <a:pt x="0" y="120000"/>
+                </a:lnTo>
+                <a:close/>
+              </a:path>
+            </a:pathLst>
+          </a:custGeom>
+        </p:spPr>
+      </p:sp>
+      <p:sp>
+        <p:nvSpPr>
+          <p:cNvPr id="133" name="Google Shape;133;gcf12c87b13_0_113:notes"/>
           <p:cNvSpPr txBox="1"/>
           <p:nvPr>
             <p:ph idx="1" type="body"/>
@@ -1309,7 +1409,7 @@
       </p:grpSpPr>
       <p:sp>
         <p:nvSpPr>
-          <p:cNvPr id="78" name="Google Shape;78;gcf12c87b13_0_67:notes"/>
+          <p:cNvPr id="78" name="Google Shape;78;gcf12c87b13_0_121:notes"/>
           <p:cNvSpPr/>
           <p:nvPr>
             <p:ph idx="2" type="sldImg"/>
@@ -1344,7 +1444,7 @@
       </p:sp>
       <p:sp>
         <p:nvSpPr>
-          <p:cNvPr id="79" name="Google Shape;79;gcf12c87b13_0_67:notes"/>
+          <p:cNvPr id="79" name="Google Shape;79;gcf12c87b13_0_121:notes"/>
           <p:cNvSpPr txBox="1"/>
           <p:nvPr>
             <p:ph idx="1" type="body"/>
@@ -1394,7 +1494,7 @@
   <p:cSld>
     <p:spTree>
       <p:nvGrpSpPr>
-        <p:cNvPr id="85" name="Shape 85"/>
+        <p:cNvPr id="84" name="Shape 84"/>
         <p:cNvGrpSpPr/>
         <p:nvPr/>
       </p:nvGrpSpPr>
@@ -1408,7 +1508,7 @@
       </p:grpSpPr>
       <p:sp>
         <p:nvSpPr>
-          <p:cNvPr id="86" name="Google Shape;86;gcf12c87b13_0_74:notes"/>
+          <p:cNvPr id="85" name="Google Shape;85;gcf12c87b13_0_67:notes"/>
           <p:cNvSpPr/>
           <p:nvPr>
             <p:ph idx="2" type="sldImg"/>
@@ -1443,7 +1543,7 @@
       </p:sp>
       <p:sp>
         <p:nvSpPr>
-          <p:cNvPr id="87" name="Google Shape;87;gcf12c87b13_0_74:notes"/>
+          <p:cNvPr id="86" name="Google Shape;86;gcf12c87b13_0_67:notes"/>
           <p:cNvSpPr txBox="1"/>
           <p:nvPr>
             <p:ph idx="1" type="body"/>
@@ -1493,7 +1593,7 @@
   <p:cSld>
     <p:spTree>
       <p:nvGrpSpPr>
-        <p:cNvPr id="93" name="Shape 93"/>
+        <p:cNvPr id="92" name="Shape 92"/>
         <p:cNvGrpSpPr/>
         <p:nvPr/>
       </p:nvGrpSpPr>
@@ -1507,7 +1607,7 @@
       </p:grpSpPr>
       <p:sp>
         <p:nvSpPr>
-          <p:cNvPr id="94" name="Google Shape;94;gcf12c87b13_0_81:notes"/>
+          <p:cNvPr id="93" name="Google Shape;93;gcf12c87b13_0_74:notes"/>
           <p:cNvSpPr/>
           <p:nvPr>
             <p:ph idx="2" type="sldImg"/>
@@ -1542,7 +1642,7 @@
       </p:sp>
       <p:sp>
         <p:nvSpPr>
-          <p:cNvPr id="95" name="Google Shape;95;gcf12c87b13_0_81:notes"/>
+          <p:cNvPr id="94" name="Google Shape;94;gcf12c87b13_0_74:notes"/>
           <p:cNvSpPr txBox="1"/>
           <p:nvPr>
             <p:ph idx="1" type="body"/>
@@ -1592,7 +1692,7 @@
   <p:cSld>
     <p:spTree>
       <p:nvGrpSpPr>
-        <p:cNvPr id="101" name="Shape 101"/>
+        <p:cNvPr id="100" name="Shape 100"/>
         <p:cNvGrpSpPr/>
         <p:nvPr/>
       </p:nvGrpSpPr>
@@ -1606,7 +1706,7 @@
       </p:grpSpPr>
       <p:sp>
         <p:nvSpPr>
-          <p:cNvPr id="102" name="Google Shape;102;gcf12c87b13_0_88:notes"/>
+          <p:cNvPr id="101" name="Google Shape;101;gcf12c87b13_0_81:notes"/>
           <p:cNvSpPr/>
           <p:nvPr>
             <p:ph idx="2" type="sldImg"/>
@@ -1641,7 +1741,7 @@
       </p:sp>
       <p:sp>
         <p:nvSpPr>
-          <p:cNvPr id="103" name="Google Shape;103;gcf12c87b13_0_88:notes"/>
+          <p:cNvPr id="102" name="Google Shape;102;gcf12c87b13_0_81:notes"/>
           <p:cNvSpPr txBox="1"/>
           <p:nvPr>
             <p:ph idx="1" type="body"/>
@@ -1691,7 +1791,7 @@
   <p:cSld>
     <p:spTree>
       <p:nvGrpSpPr>
-        <p:cNvPr id="107" name="Shape 107"/>
+        <p:cNvPr id="108" name="Shape 108"/>
         <p:cNvGrpSpPr/>
         <p:nvPr/>
       </p:nvGrpSpPr>
@@ -1705,7 +1805,7 @@
       </p:grpSpPr>
       <p:sp>
         <p:nvSpPr>
-          <p:cNvPr id="108" name="Google Shape;108;gcf12c87b13_0_93:notes"/>
+          <p:cNvPr id="109" name="Google Shape;109;gcf12c87b13_0_88:notes"/>
           <p:cNvSpPr/>
           <p:nvPr>
             <p:ph idx="2" type="sldImg"/>
@@ -1740,7 +1840,7 @@
       </p:sp>
       <p:sp>
         <p:nvSpPr>
-          <p:cNvPr id="109" name="Google Shape;109;gcf12c87b13_0_93:notes"/>
+          <p:cNvPr id="110" name="Google Shape;110;gcf12c87b13_0_88:notes"/>
           <p:cNvSpPr txBox="1"/>
           <p:nvPr>
             <p:ph idx="1" type="body"/>
@@ -6677,7 +6777,7 @@
   <p:cSld>
     <p:spTree>
       <p:nvGrpSpPr>
-        <p:cNvPr id="118" name="Shape 118"/>
+        <p:cNvPr id="117" name="Shape 117"/>
         <p:cNvGrpSpPr/>
         <p:nvPr/>
       </p:nvGrpSpPr>
@@ -6691,7 +6791,7 @@
       </p:grpSpPr>
       <p:sp>
         <p:nvSpPr>
-          <p:cNvPr id="119" name="Google Shape;119;p22"/>
+          <p:cNvPr id="118" name="Google Shape;118;p22"/>
           <p:cNvSpPr txBox="1"/>
           <p:nvPr>
             <p:ph type="title"/>
@@ -6727,7 +6827,7 @@
                   <a:srgbClr val="F1C232"/>
                 </a:solidFill>
               </a:rPr>
-              <a:t>Links</a:t>
+              <a:t>Enhancements / Future Development</a:t>
             </a:r>
             <a:endParaRPr>
               <a:solidFill>
@@ -6739,7 +6839,383 @@
       </p:sp>
       <p:pic>
         <p:nvPicPr>
+          <p:cNvPr id="119" name="Google Shape;119;p22"/>
+          <p:cNvPicPr preferRelativeResize="0"/>
+          <p:nvPr/>
+        </p:nvPicPr>
+        <p:blipFill>
+          <a:blip r:embed="rId3">
+            <a:alphaModFix/>
+          </a:blip>
+          <a:stretch>
+            <a:fillRect/>
+          </a:stretch>
+        </p:blipFill>
+        <p:spPr>
+          <a:xfrm>
+            <a:off x="4672350" y="2691550"/>
+            <a:ext cx="3904651" cy="2017401"/>
+          </a:xfrm>
+          <a:prstGeom prst="rect">
+            <a:avLst/>
+          </a:prstGeom>
+          <a:noFill/>
+          <a:ln>
+            <a:noFill/>
+          </a:ln>
+        </p:spPr>
+      </p:pic>
+      <p:sp>
+        <p:nvSpPr>
           <p:cNvPr id="120" name="Google Shape;120;p22"/>
+          <p:cNvSpPr txBox="1"/>
+          <p:nvPr/>
+        </p:nvSpPr>
+        <p:spPr>
+          <a:xfrm>
+            <a:off x="654925" y="1221975"/>
+            <a:ext cx="4600500" cy="461700"/>
+          </a:xfrm>
+          <a:prstGeom prst="rect">
+            <a:avLst/>
+          </a:prstGeom>
+          <a:noFill/>
+          <a:ln>
+            <a:noFill/>
+          </a:ln>
+        </p:spPr>
+        <p:txBody>
+          <a:bodyPr anchorCtr="0" anchor="t" bIns="91425" lIns="91425" spcFirstLastPara="1" rIns="91425" wrap="square" tIns="91425">
+            <a:spAutoFit/>
+          </a:bodyPr>
+          <a:lstStyle/>
+          <a:p>
+            <a:pPr indent="0" lvl="0" marL="0" rtl="0" algn="l">
+              <a:spcBef>
+                <a:spcPts val="0"/>
+              </a:spcBef>
+              <a:spcAft>
+                <a:spcPts val="0"/>
+              </a:spcAft>
+              <a:buNone/>
+            </a:pPr>
+            <a:r>
+              <a:t/>
+            </a:r>
+            <a:endParaRPr sz="1800">
+              <a:solidFill>
+                <a:srgbClr val="F1C232"/>
+              </a:solidFill>
+            </a:endParaRPr>
+          </a:p>
+        </p:txBody>
+      </p:sp>
+      <p:sp>
+        <p:nvSpPr>
+          <p:cNvPr id="121" name="Google Shape;121;p22"/>
+          <p:cNvSpPr txBox="1"/>
+          <p:nvPr/>
+        </p:nvSpPr>
+        <p:spPr>
+          <a:xfrm>
+            <a:off x="551100" y="1349775"/>
+            <a:ext cx="7947000" cy="2662800"/>
+          </a:xfrm>
+          <a:prstGeom prst="rect">
+            <a:avLst/>
+          </a:prstGeom>
+          <a:noFill/>
+          <a:ln>
+            <a:noFill/>
+          </a:ln>
+        </p:spPr>
+        <p:txBody>
+          <a:bodyPr anchorCtr="0" anchor="t" bIns="91425" lIns="91425" spcFirstLastPara="1" rIns="91425" wrap="square" tIns="91425">
+            <a:spAutoFit/>
+          </a:bodyPr>
+          <a:lstStyle/>
+          <a:p>
+            <a:pPr indent="-374650" lvl="0" marL="457200" rtl="0" algn="l">
+              <a:spcBef>
+                <a:spcPts val="0"/>
+              </a:spcBef>
+              <a:spcAft>
+                <a:spcPts val="0"/>
+              </a:spcAft>
+              <a:buClr>
+                <a:srgbClr val="F1C232"/>
+              </a:buClr>
+              <a:buSzPts val="2300"/>
+              <a:buChar char="●"/>
+            </a:pPr>
+            <a:r>
+              <a:rPr lang="en" sz="2300">
+                <a:solidFill>
+                  <a:srgbClr val="F1C232"/>
+                </a:solidFill>
+              </a:rPr>
+              <a:t>Incorporating</a:t>
+            </a:r>
+            <a:r>
+              <a:rPr lang="en" sz="2300">
+                <a:solidFill>
+                  <a:srgbClr val="F1C232"/>
+                </a:solidFill>
+              </a:rPr>
+              <a:t> Additional Data</a:t>
+            </a:r>
+            <a:endParaRPr sz="2300">
+              <a:solidFill>
+                <a:srgbClr val="F1C232"/>
+              </a:solidFill>
+            </a:endParaRPr>
+          </a:p>
+          <a:p>
+            <a:pPr indent="-374650" lvl="1" marL="914400" rtl="0" algn="l">
+              <a:spcBef>
+                <a:spcPts val="0"/>
+              </a:spcBef>
+              <a:spcAft>
+                <a:spcPts val="0"/>
+              </a:spcAft>
+              <a:buClr>
+                <a:srgbClr val="F1C232"/>
+              </a:buClr>
+              <a:buSzPts val="2300"/>
+              <a:buChar char="○"/>
+            </a:pPr>
+            <a:r>
+              <a:rPr lang="en" sz="2300">
+                <a:solidFill>
+                  <a:srgbClr val="F1C232"/>
+                </a:solidFill>
+              </a:rPr>
+              <a:t>TV Shows</a:t>
+            </a:r>
+            <a:endParaRPr sz="2300">
+              <a:solidFill>
+                <a:srgbClr val="F1C232"/>
+              </a:solidFill>
+            </a:endParaRPr>
+          </a:p>
+          <a:p>
+            <a:pPr indent="-374650" lvl="1" marL="914400" rtl="0" algn="l">
+              <a:spcBef>
+                <a:spcPts val="0"/>
+              </a:spcBef>
+              <a:spcAft>
+                <a:spcPts val="0"/>
+              </a:spcAft>
+              <a:buClr>
+                <a:srgbClr val="F1C232"/>
+              </a:buClr>
+              <a:buSzPts val="2300"/>
+              <a:buChar char="○"/>
+            </a:pPr>
+            <a:r>
+              <a:rPr lang="en" sz="2300">
+                <a:solidFill>
+                  <a:srgbClr val="F1C232"/>
+                </a:solidFill>
+              </a:rPr>
+              <a:t>Links  to Streaming Providers</a:t>
+            </a:r>
+            <a:endParaRPr sz="2300">
+              <a:solidFill>
+                <a:srgbClr val="F1C232"/>
+              </a:solidFill>
+            </a:endParaRPr>
+          </a:p>
+          <a:p>
+            <a:pPr indent="-374650" lvl="1" marL="914400" rtl="0" algn="l">
+              <a:spcBef>
+                <a:spcPts val="0"/>
+              </a:spcBef>
+              <a:spcAft>
+                <a:spcPts val="0"/>
+              </a:spcAft>
+              <a:buClr>
+                <a:srgbClr val="F1C232"/>
+              </a:buClr>
+              <a:buSzPts val="2300"/>
+              <a:buChar char="○"/>
+            </a:pPr>
+            <a:r>
+              <a:rPr lang="en" sz="2300">
+                <a:solidFill>
+                  <a:srgbClr val="F1C232"/>
+                </a:solidFill>
+              </a:rPr>
+              <a:t>Film Trailers</a:t>
+            </a:r>
+            <a:endParaRPr sz="2300">
+              <a:solidFill>
+                <a:srgbClr val="F1C232"/>
+              </a:solidFill>
+            </a:endParaRPr>
+          </a:p>
+          <a:p>
+            <a:pPr indent="-374650" lvl="1" marL="914400" rtl="0" algn="l">
+              <a:spcBef>
+                <a:spcPts val="0"/>
+              </a:spcBef>
+              <a:spcAft>
+                <a:spcPts val="0"/>
+              </a:spcAft>
+              <a:buClr>
+                <a:srgbClr val="F1C232"/>
+              </a:buClr>
+              <a:buSzPts val="2300"/>
+              <a:buChar char="○"/>
+            </a:pPr>
+            <a:r>
+              <a:rPr lang="en" sz="2300">
+                <a:solidFill>
+                  <a:srgbClr val="F1C232"/>
+                </a:solidFill>
+              </a:rPr>
+              <a:t>Actor Bios</a:t>
+            </a:r>
+            <a:endParaRPr sz="2300">
+              <a:solidFill>
+                <a:srgbClr val="F1C232"/>
+              </a:solidFill>
+            </a:endParaRPr>
+          </a:p>
+          <a:p>
+            <a:pPr indent="-374650" lvl="1" marL="914400" rtl="0" algn="l">
+              <a:spcBef>
+                <a:spcPts val="0"/>
+              </a:spcBef>
+              <a:spcAft>
+                <a:spcPts val="0"/>
+              </a:spcAft>
+              <a:buClr>
+                <a:srgbClr val="F1C232"/>
+              </a:buClr>
+              <a:buSzPts val="2300"/>
+              <a:buChar char="○"/>
+            </a:pPr>
+            <a:r>
+              <a:rPr lang="en" sz="2300">
+                <a:solidFill>
+                  <a:srgbClr val="F1C232"/>
+                </a:solidFill>
+              </a:rPr>
+              <a:t>What’s in Theaters</a:t>
+            </a:r>
+            <a:endParaRPr sz="2300">
+              <a:solidFill>
+                <a:srgbClr val="F1C232"/>
+              </a:solidFill>
+            </a:endParaRPr>
+          </a:p>
+          <a:p>
+            <a:pPr indent="-374650" lvl="0" marL="457200" rtl="0" algn="l">
+              <a:spcBef>
+                <a:spcPts val="0"/>
+              </a:spcBef>
+              <a:spcAft>
+                <a:spcPts val="0"/>
+              </a:spcAft>
+              <a:buClr>
+                <a:srgbClr val="F1C232"/>
+              </a:buClr>
+              <a:buSzPts val="2300"/>
+              <a:buChar char="●"/>
+            </a:pPr>
+            <a:r>
+              <a:rPr lang="en" sz="2300">
+                <a:solidFill>
+                  <a:srgbClr val="F1C232"/>
+                </a:solidFill>
+              </a:rPr>
+              <a:t>Mark a Movie as a Favorite</a:t>
+            </a:r>
+            <a:endParaRPr sz="2300">
+              <a:solidFill>
+                <a:srgbClr val="F1C232"/>
+              </a:solidFill>
+            </a:endParaRPr>
+          </a:p>
+        </p:txBody>
+      </p:sp>
+    </p:spTree>
+  </p:cSld>
+  <p:clrMapOvr>
+    <a:masterClrMapping/>
+  </p:clrMapOvr>
+</p:sld>
+</file>
+
+<file path=ppt/slides/slide11.xml><?xml version="1.0" encoding="utf-8"?>
+<p:sld xmlns:a="http://schemas.openxmlformats.org/drawingml/2006/main" xmlns:r="http://schemas.openxmlformats.org/officeDocument/2006/relationships" xmlns:mc="http://schemas.openxmlformats.org/markup-compatibility/2006" xmlns:mv="urn:schemas-microsoft-com:mac:vml" xmlns:p="http://schemas.openxmlformats.org/presentationml/2006/main" xmlns:c="http://schemas.openxmlformats.org/drawingml/2006/chart" xmlns:dgm="http://schemas.openxmlformats.org/drawingml/2006/diagram" xmlns:o="urn:schemas-microsoft-com:office:office" xmlns:v="urn:schemas-microsoft-com:vml" xmlns:pvml="urn:schemas-microsoft-com:office:powerpoint" xmlns:com="http://schemas.openxmlformats.org/drawingml/2006/compatibility" xmlns:p14="http://schemas.microsoft.com/office/powerpoint/2010/main" xmlns:p15="http://schemas.microsoft.com/office/powerpoint/2012/main" xmlns:ahyp="http://schemas.microsoft.com/office/drawing/2018/hyperlinkcolor">
+  <p:cSld>
+    <p:spTree>
+      <p:nvGrpSpPr>
+        <p:cNvPr id="125" name="Shape 125"/>
+        <p:cNvGrpSpPr/>
+        <p:nvPr/>
+      </p:nvGrpSpPr>
+      <p:grpSpPr>
+        <a:xfrm>
+          <a:off x="0" y="0"/>
+          <a:ext cx="0" cy="0"/>
+          <a:chOff x="0" y="0"/>
+          <a:chExt cx="0" cy="0"/>
+        </a:xfrm>
+      </p:grpSpPr>
+      <p:sp>
+        <p:nvSpPr>
+          <p:cNvPr id="126" name="Google Shape;126;p23"/>
+          <p:cNvSpPr txBox="1"/>
+          <p:nvPr>
+            <p:ph type="title"/>
+          </p:nvPr>
+        </p:nvSpPr>
+        <p:spPr>
+          <a:xfrm>
+            <a:off x="311700" y="445025"/>
+            <a:ext cx="8520600" cy="572700"/>
+          </a:xfrm>
+          <a:prstGeom prst="rect">
+            <a:avLst/>
+          </a:prstGeom>
+        </p:spPr>
+        <p:txBody>
+          <a:bodyPr anchorCtr="0" anchor="t" bIns="91425" lIns="91425" spcFirstLastPara="1" rIns="91425" wrap="square" tIns="91425">
+            <a:normAutofit fontScale="90000"/>
+          </a:bodyPr>
+          <a:lstStyle/>
+          <a:p>
+            <a:pPr indent="0" lvl="0" marL="0" rtl="0" algn="l">
+              <a:spcBef>
+                <a:spcPts val="0"/>
+              </a:spcBef>
+              <a:spcAft>
+                <a:spcPts val="0"/>
+              </a:spcAft>
+              <a:buNone/>
+            </a:pPr>
+            <a:r>
+              <a:rPr lang="en">
+                <a:solidFill>
+                  <a:srgbClr val="F1C232"/>
+                </a:solidFill>
+              </a:rPr>
+              <a:t>Links</a:t>
+            </a:r>
+            <a:endParaRPr>
+              <a:solidFill>
+                <a:srgbClr val="F1C232"/>
+              </a:solidFill>
+            </a:endParaRPr>
+          </a:p>
+        </p:txBody>
+      </p:sp>
+      <p:pic>
+        <p:nvPicPr>
+          <p:cNvPr id="127" name="Google Shape;127;p23"/>
           <p:cNvPicPr preferRelativeResize="0"/>
           <p:nvPr/>
         </p:nvPicPr>
@@ -6767,7 +7243,7 @@
       </p:pic>
       <p:sp>
         <p:nvSpPr>
-          <p:cNvPr id="121" name="Google Shape;121;p22"/>
+          <p:cNvPr id="128" name="Google Shape;128;p23"/>
           <p:cNvSpPr txBox="1"/>
           <p:nvPr/>
         </p:nvSpPr>
@@ -6812,7 +7288,7 @@
       </p:sp>
       <p:sp>
         <p:nvSpPr>
-          <p:cNvPr id="122" name="Google Shape;122;p22"/>
+          <p:cNvPr id="129" name="Google Shape;129;p23"/>
           <p:cNvSpPr txBox="1"/>
           <p:nvPr/>
         </p:nvSpPr>
@@ -6998,7 +7474,7 @@
       </p:sp>
       <p:graphicFrame>
         <p:nvGraphicFramePr>
-          <p:cNvPr id="123" name="Google Shape;123;p22"/>
+          <p:cNvPr id="130" name="Google Shape;130;p23"/>
           <p:cNvGraphicFramePr/>
           <p:nvPr/>
         </p:nvGraphicFramePr>
@@ -7011,7 +7487,7 @@
             <a:tbl>
               <a:tblPr>
                 <a:noFill/>
-                <a:tableStyleId>{FBBCFB08-0CAA-4C1C-AB3A-E03B702FE88C}</a:tableStyleId>
+                <a:tableStyleId>{28847086-6B6A-4628-BBE7-2DAFCACCB2FB}</a:tableStyleId>
               </a:tblPr>
               <a:tblGrid>
                 <a:gridCol w="2096450"/>
@@ -7678,12 +8154,12 @@
 </p:sld>
 </file>
 
-<file path=ppt/slides/slide11.xml><?xml version="1.0" encoding="utf-8"?>
+<file path=ppt/slides/slide12.xml><?xml version="1.0" encoding="utf-8"?>
 <p:sld xmlns:a="http://schemas.openxmlformats.org/drawingml/2006/main" xmlns:r="http://schemas.openxmlformats.org/officeDocument/2006/relationships" xmlns:mc="http://schemas.openxmlformats.org/markup-compatibility/2006" xmlns:mv="urn:schemas-microsoft-com:mac:vml" xmlns:p="http://schemas.openxmlformats.org/presentationml/2006/main" xmlns:c="http://schemas.openxmlformats.org/drawingml/2006/chart" xmlns:dgm="http://schemas.openxmlformats.org/drawingml/2006/diagram" xmlns:o="urn:schemas-microsoft-com:office:office" xmlns:v="urn:schemas-microsoft-com:vml" xmlns:pvml="urn:schemas-microsoft-com:office:powerpoint" xmlns:com="http://schemas.openxmlformats.org/drawingml/2006/compatibility" xmlns:p14="http://schemas.microsoft.com/office/powerpoint/2010/main" xmlns:p15="http://schemas.microsoft.com/office/powerpoint/2012/main" xmlns:ahyp="http://schemas.microsoft.com/office/drawing/2018/hyperlinkcolor">
   <p:cSld>
     <p:spTree>
       <p:nvGrpSpPr>
-        <p:cNvPr id="127" name="Shape 127"/>
+        <p:cNvPr id="134" name="Shape 134"/>
         <p:cNvGrpSpPr/>
         <p:nvPr/>
       </p:nvGrpSpPr>
@@ -7697,7 +8173,7 @@
       </p:grpSpPr>
       <p:sp>
         <p:nvSpPr>
-          <p:cNvPr id="128" name="Google Shape;128;p23"/>
+          <p:cNvPr id="135" name="Google Shape;135;p24"/>
           <p:cNvSpPr txBox="1"/>
           <p:nvPr>
             <p:ph type="title"/>
@@ -7745,7 +8221,7 @@
       </p:sp>
       <p:pic>
         <p:nvPicPr>
-          <p:cNvPr id="129" name="Google Shape;129;p23"/>
+          <p:cNvPr id="136" name="Google Shape;136;p24"/>
           <p:cNvPicPr preferRelativeResize="0"/>
           <p:nvPr/>
         </p:nvPicPr>
@@ -7773,7 +8249,7 @@
       </p:pic>
       <p:sp>
         <p:nvSpPr>
-          <p:cNvPr id="130" name="Google Shape;130;p23"/>
+          <p:cNvPr id="137" name="Google Shape;137;p24"/>
           <p:cNvSpPr txBox="1"/>
           <p:nvPr/>
         </p:nvSpPr>
@@ -7818,7 +8294,7 @@
       </p:sp>
       <p:pic>
         <p:nvPicPr>
-          <p:cNvPr id="131" name="Google Shape;131;p23"/>
+          <p:cNvPr id="138" name="Google Shape;138;p24"/>
           <p:cNvPicPr preferRelativeResize="0"/>
           <p:nvPr/>
         </p:nvPicPr>
@@ -8603,7 +9079,7 @@
                   <a:srgbClr val="F1C232"/>
                 </a:solidFill>
               </a:rPr>
-              <a:t>Concept</a:t>
+              <a:t>Motivation / User Story</a:t>
             </a:r>
             <a:endParaRPr>
               <a:solidFill>
@@ -8649,8 +9125,8 @@
         </p:nvSpPr>
         <p:spPr>
           <a:xfrm>
-            <a:off x="654925" y="1221975"/>
-            <a:ext cx="4600500" cy="3232500"/>
+            <a:off x="654900" y="1126125"/>
+            <a:ext cx="7922100" cy="3894300"/>
           </a:xfrm>
           <a:prstGeom prst="rect">
             <a:avLst/>
@@ -8666,30 +9142,6 @@
           </a:bodyPr>
           <a:lstStyle/>
           <a:p>
-            <a:pPr indent="0" lvl="0" marL="0" rtl="0" algn="l">
-              <a:spcBef>
-                <a:spcPts val="0"/>
-              </a:spcBef>
-              <a:spcAft>
-                <a:spcPts val="0"/>
-              </a:spcAft>
-              <a:buNone/>
-            </a:pPr>
-            <a:r>
-              <a:rPr lang="en" sz="1800">
-                <a:solidFill>
-                  <a:srgbClr val="F1C232"/>
-                </a:solidFill>
-              </a:rPr>
-              <a:t>FilmBank gives a user the ability to:</a:t>
-            </a:r>
-            <a:endParaRPr sz="1800">
-              <a:solidFill>
-                <a:srgbClr val="F1C232"/>
-              </a:solidFill>
-            </a:endParaRPr>
-          </a:p>
-          <a:p>
             <a:pPr indent="-342900" lvl="0" marL="457200" rtl="0" algn="l">
               <a:spcBef>
                 <a:spcPts val="0"/>
@@ -8709,7 +9161,7 @@
                   <a:srgbClr val="F1C232"/>
                 </a:solidFill>
               </a:rPr>
-              <a:t>Search for a film from any time in any genre</a:t>
+              <a:t>With the COVID-19 lockdown, everyone needs more ways to spend their free time while stuck at home.  </a:t>
             </a:r>
             <a:endParaRPr sz="1800">
               <a:solidFill>
@@ -8737,7 +9189,7 @@
                   <a:srgbClr val="F1C232"/>
                 </a:solidFill>
               </a:rPr>
-              <a:t>See a list of films that meet the search criteria</a:t>
+              <a:t>Give the public ideas for entertainment and ways to choose the best films to watch</a:t>
             </a:r>
             <a:endParaRPr sz="1800">
               <a:solidFill>
@@ -8746,171 +9198,310 @@
             </a:endParaRPr>
           </a:p>
           <a:p>
-            <a:pPr indent="-342900" lvl="0" marL="457200" rtl="0" algn="l">
-              <a:spcBef>
-                <a:spcPts val="0"/>
-              </a:spcBef>
-              <a:spcAft>
-                <a:spcPts val="0"/>
-              </a:spcAft>
-              <a:buClr>
-                <a:srgbClr val="F1C232"/>
-              </a:buClr>
-              <a:buSzPts val="1800"/>
-              <a:buChar char="●"/>
+            <a:pPr indent="0" lvl="0" marL="0" rtl="0" algn="l">
+              <a:spcBef>
+                <a:spcPts val="0"/>
+              </a:spcBef>
+              <a:spcAft>
+                <a:spcPts val="0"/>
+              </a:spcAft>
+              <a:buNone/>
             </a:pPr>
             <a:r>
-              <a:rPr lang="en" sz="1800">
-                <a:solidFill>
-                  <a:srgbClr val="F1C232"/>
-                </a:solidFill>
-              </a:rPr>
-              <a:t>Get a description of any film including:</a:t>
+              <a:t/>
             </a:r>
-            <a:endParaRPr sz="1800">
+            <a:endParaRPr sz="700">
               <a:solidFill>
                 <a:srgbClr val="F1C232"/>
               </a:solidFill>
             </a:endParaRPr>
           </a:p>
           <a:p>
-            <a:pPr indent="-342900" lvl="1" marL="914400" rtl="0" algn="l">
-              <a:spcBef>
-                <a:spcPts val="0"/>
-              </a:spcBef>
-              <a:spcAft>
-                <a:spcPts val="0"/>
-              </a:spcAft>
-              <a:buClr>
-                <a:srgbClr val="F1C232"/>
-              </a:buClr>
-              <a:buSzPts val="1800"/>
-              <a:buChar char="○"/>
+            <a:pPr indent="0" lvl="0" marL="457200" rtl="0" algn="l">
+              <a:spcBef>
+                <a:spcPts val="0"/>
+              </a:spcBef>
+              <a:spcAft>
+                <a:spcPts val="0"/>
+              </a:spcAft>
+              <a:buNone/>
             </a:pPr>
             <a:r>
               <a:rPr lang="en" sz="1800">
                 <a:solidFill>
                   <a:srgbClr val="F1C232"/>
                 </a:solidFill>
+                <a:latin typeface="Consolas"/>
+                <a:ea typeface="Consolas"/>
+                <a:cs typeface="Consolas"/>
+                <a:sym typeface="Consolas"/>
               </a:rPr>
-              <a:t>Description</a:t>
+              <a:t>GIVEN that I am interested in </a:t>
             </a:r>
             <a:endParaRPr sz="1800">
               <a:solidFill>
                 <a:srgbClr val="F1C232"/>
               </a:solidFill>
+              <a:latin typeface="Consolas"/>
+              <a:ea typeface="Consolas"/>
+              <a:cs typeface="Consolas"/>
+              <a:sym typeface="Consolas"/>
             </a:endParaRPr>
           </a:p>
           <a:p>
-            <a:pPr indent="-342900" lvl="1" marL="914400" rtl="0" algn="l">
-              <a:spcBef>
-                <a:spcPts val="0"/>
-              </a:spcBef>
-              <a:spcAft>
-                <a:spcPts val="0"/>
-              </a:spcAft>
-              <a:buClr>
-                <a:srgbClr val="F1C232"/>
-              </a:buClr>
-              <a:buSzPts val="1800"/>
-              <a:buChar char="○"/>
+            <a:pPr indent="0" lvl="0" marL="457200" rtl="0" algn="l">
+              <a:spcBef>
+                <a:spcPts val="0"/>
+              </a:spcBef>
+              <a:spcAft>
+                <a:spcPts val="0"/>
+              </a:spcAft>
+              <a:buNone/>
             </a:pPr>
             <a:r>
               <a:rPr lang="en" sz="1800">
                 <a:solidFill>
                   <a:srgbClr val="F1C232"/>
                 </a:solidFill>
+                <a:latin typeface="Consolas"/>
+                <a:ea typeface="Consolas"/>
+                <a:cs typeface="Consolas"/>
+                <a:sym typeface="Consolas"/>
               </a:rPr>
-              <a:t>Release Date</a:t>
+              <a:t>information about a particular film,</a:t>
             </a:r>
             <a:endParaRPr sz="1800">
               <a:solidFill>
                 <a:srgbClr val="F1C232"/>
               </a:solidFill>
+              <a:latin typeface="Consolas"/>
+              <a:ea typeface="Consolas"/>
+              <a:cs typeface="Consolas"/>
+              <a:sym typeface="Consolas"/>
             </a:endParaRPr>
           </a:p>
           <a:p>
-            <a:pPr indent="-342900" lvl="1" marL="914400" rtl="0" algn="l">
-              <a:spcBef>
-                <a:spcPts val="0"/>
-              </a:spcBef>
-              <a:spcAft>
-                <a:spcPts val="0"/>
-              </a:spcAft>
-              <a:buClr>
-                <a:srgbClr val="F1C232"/>
-              </a:buClr>
-              <a:buSzPts val="1800"/>
-              <a:buChar char="○"/>
+            <a:pPr indent="0" lvl="0" marL="457200" rtl="0" algn="l">
+              <a:spcBef>
+                <a:spcPts val="0"/>
+              </a:spcBef>
+              <a:spcAft>
+                <a:spcPts val="0"/>
+              </a:spcAft>
+              <a:buNone/>
             </a:pPr>
             <a:r>
               <a:rPr lang="en" sz="1800">
                 <a:solidFill>
                   <a:srgbClr val="F1C232"/>
                 </a:solidFill>
+                <a:latin typeface="Consolas"/>
+                <a:ea typeface="Consolas"/>
+                <a:cs typeface="Consolas"/>
+                <a:sym typeface="Consolas"/>
               </a:rPr>
-              <a:t>Cast</a:t>
+              <a:t>WHEN I search for a film</a:t>
             </a:r>
             <a:endParaRPr sz="1800">
               <a:solidFill>
                 <a:srgbClr val="F1C232"/>
               </a:solidFill>
+              <a:latin typeface="Consolas"/>
+              <a:ea typeface="Consolas"/>
+              <a:cs typeface="Consolas"/>
+              <a:sym typeface="Consolas"/>
             </a:endParaRPr>
           </a:p>
           <a:p>
-            <a:pPr indent="-342900" lvl="1" marL="914400" rtl="0" algn="l">
-              <a:spcBef>
-                <a:spcPts val="0"/>
-              </a:spcBef>
-              <a:spcAft>
-                <a:spcPts val="0"/>
-              </a:spcAft>
-              <a:buClr>
-                <a:srgbClr val="F1C232"/>
-              </a:buClr>
-              <a:buSzPts val="1800"/>
-              <a:buChar char="○"/>
+            <a:pPr indent="0" lvl="0" marL="457200" rtl="0" algn="l">
+              <a:spcBef>
+                <a:spcPts val="0"/>
+              </a:spcBef>
+              <a:spcAft>
+                <a:spcPts val="0"/>
+              </a:spcAft>
+              <a:buNone/>
             </a:pPr>
             <a:r>
               <a:rPr lang="en" sz="1800">
                 <a:solidFill>
                   <a:srgbClr val="F1C232"/>
                 </a:solidFill>
+                <a:latin typeface="Consolas"/>
+                <a:ea typeface="Consolas"/>
+                <a:cs typeface="Consolas"/>
+                <a:sym typeface="Consolas"/>
               </a:rPr>
-              <a:t>Where It’s Streaming</a:t>
+              <a:t>THEN I see the poster and </a:t>
             </a:r>
             <a:endParaRPr sz="1800">
               <a:solidFill>
                 <a:srgbClr val="F1C232"/>
               </a:solidFill>
+              <a:latin typeface="Consolas"/>
+              <a:ea typeface="Consolas"/>
+              <a:cs typeface="Consolas"/>
+              <a:sym typeface="Consolas"/>
             </a:endParaRPr>
           </a:p>
           <a:p>
-            <a:pPr indent="-342900" lvl="1" marL="914400" rtl="0" algn="l">
-              <a:spcBef>
-                <a:spcPts val="0"/>
-              </a:spcBef>
-              <a:spcAft>
-                <a:spcPts val="0"/>
-              </a:spcAft>
-              <a:buClr>
-                <a:srgbClr val="F1C232"/>
-              </a:buClr>
-              <a:buSzPts val="1800"/>
-              <a:buChar char="○"/>
+            <a:pPr indent="0" lvl="0" marL="457200" rtl="0" algn="l">
+              <a:spcBef>
+                <a:spcPts val="0"/>
+              </a:spcBef>
+              <a:spcAft>
+                <a:spcPts val="0"/>
+              </a:spcAft>
+              <a:buNone/>
             </a:pPr>
             <a:r>
               <a:rPr lang="en" sz="1800">
                 <a:solidFill>
                   <a:srgbClr val="F1C232"/>
                 </a:solidFill>
+                <a:latin typeface="Consolas"/>
+                <a:ea typeface="Consolas"/>
+                <a:cs typeface="Consolas"/>
+                <a:sym typeface="Consolas"/>
               </a:rPr>
-              <a:t>New York Times Movie Review </a:t>
+              <a:t>basic information about the film.</a:t>
             </a:r>
             <a:endParaRPr sz="1800">
               <a:solidFill>
                 <a:srgbClr val="F1C232"/>
               </a:solidFill>
+              <a:latin typeface="Consolas"/>
+              <a:ea typeface="Consolas"/>
+              <a:cs typeface="Consolas"/>
+              <a:sym typeface="Consolas"/>
+            </a:endParaRPr>
+          </a:p>
+          <a:p>
+            <a:pPr indent="0" lvl="0" marL="457200" rtl="0" algn="l">
+              <a:spcBef>
+                <a:spcPts val="0"/>
+              </a:spcBef>
+              <a:spcAft>
+                <a:spcPts val="0"/>
+              </a:spcAft>
+              <a:buNone/>
+            </a:pPr>
+            <a:r>
+              <a:rPr lang="en" sz="1800">
+                <a:solidFill>
+                  <a:srgbClr val="F1C232"/>
+                </a:solidFill>
+                <a:latin typeface="Consolas"/>
+                <a:ea typeface="Consolas"/>
+                <a:cs typeface="Consolas"/>
+                <a:sym typeface="Consolas"/>
+              </a:rPr>
+              <a:t>WHEN I want to find where </a:t>
+            </a:r>
+            <a:endParaRPr sz="1800">
+              <a:solidFill>
+                <a:srgbClr val="F1C232"/>
+              </a:solidFill>
+              <a:latin typeface="Consolas"/>
+              <a:ea typeface="Consolas"/>
+              <a:cs typeface="Consolas"/>
+              <a:sym typeface="Consolas"/>
+            </a:endParaRPr>
+          </a:p>
+          <a:p>
+            <a:pPr indent="0" lvl="0" marL="457200" rtl="0" algn="l">
+              <a:spcBef>
+                <a:spcPts val="0"/>
+              </a:spcBef>
+              <a:spcAft>
+                <a:spcPts val="0"/>
+              </a:spcAft>
+              <a:buNone/>
+            </a:pPr>
+            <a:r>
+              <a:rPr lang="en" sz="1800">
+                <a:solidFill>
+                  <a:srgbClr val="F1C232"/>
+                </a:solidFill>
+                <a:latin typeface="Consolas"/>
+                <a:ea typeface="Consolas"/>
+                <a:cs typeface="Consolas"/>
+                <a:sym typeface="Consolas"/>
+              </a:rPr>
+              <a:t>a file is streaming</a:t>
+            </a:r>
+            <a:endParaRPr sz="1800">
+              <a:solidFill>
+                <a:srgbClr val="F1C232"/>
+              </a:solidFill>
+              <a:latin typeface="Consolas"/>
+              <a:ea typeface="Consolas"/>
+              <a:cs typeface="Consolas"/>
+              <a:sym typeface="Consolas"/>
+            </a:endParaRPr>
+          </a:p>
+          <a:p>
+            <a:pPr indent="0" lvl="0" marL="457200" rtl="0" algn="l">
+              <a:spcBef>
+                <a:spcPts val="0"/>
+              </a:spcBef>
+              <a:spcAft>
+                <a:spcPts val="0"/>
+              </a:spcAft>
+              <a:buNone/>
+            </a:pPr>
+            <a:r>
+              <a:rPr lang="en" sz="1800">
+                <a:solidFill>
+                  <a:srgbClr val="F1C232"/>
+                </a:solidFill>
+                <a:latin typeface="Consolas"/>
+                <a:ea typeface="Consolas"/>
+                <a:cs typeface="Consolas"/>
+                <a:sym typeface="Consolas"/>
+              </a:rPr>
+              <a:t>THEN I see a listing of </a:t>
+            </a:r>
+            <a:endParaRPr sz="1800">
+              <a:solidFill>
+                <a:srgbClr val="F1C232"/>
+              </a:solidFill>
+              <a:latin typeface="Consolas"/>
+              <a:ea typeface="Consolas"/>
+              <a:cs typeface="Consolas"/>
+              <a:sym typeface="Consolas"/>
+            </a:endParaRPr>
+          </a:p>
+          <a:p>
+            <a:pPr indent="0" lvl="0" marL="457200" rtl="0" algn="l">
+              <a:spcBef>
+                <a:spcPts val="0"/>
+              </a:spcBef>
+              <a:spcAft>
+                <a:spcPts val="0"/>
+              </a:spcAft>
+              <a:buNone/>
+            </a:pPr>
+            <a:r>
+              <a:rPr lang="en" sz="1800">
+                <a:solidFill>
+                  <a:srgbClr val="F1C232"/>
+                </a:solidFill>
+                <a:latin typeface="Consolas"/>
+                <a:ea typeface="Consolas"/>
+                <a:cs typeface="Consolas"/>
+                <a:sym typeface="Consolas"/>
+              </a:rPr>
+              <a:t>streaming providers</a:t>
+            </a:r>
+            <a:endParaRPr sz="1800">
+              <a:solidFill>
+                <a:srgbClr val="F1C232"/>
+              </a:solidFill>
+              <a:latin typeface="Consolas"/>
+              <a:ea typeface="Consolas"/>
+              <a:cs typeface="Consolas"/>
+              <a:sym typeface="Consolas"/>
             </a:endParaRPr>
           </a:p>
         </p:txBody>
@@ -8978,7 +9569,7 @@
                   <a:srgbClr val="F1C232"/>
                 </a:solidFill>
               </a:rPr>
-              <a:t>Technology</a:t>
+              <a:t>Concept</a:t>
             </a:r>
             <a:endParaRPr>
               <a:solidFill>
@@ -9025,7 +9616,7 @@
         <p:spPr>
           <a:xfrm>
             <a:off x="654925" y="1221975"/>
-            <a:ext cx="4600500" cy="461700"/>
+            <a:ext cx="4600500" cy="3232500"/>
           </a:xfrm>
           <a:prstGeom prst="rect">
             <a:avLst/>
@@ -9051,70 +9642,21 @@
               <a:buNone/>
             </a:pPr>
             <a:r>
-              <a:t/>
+              <a:rPr lang="en" sz="1800">
+                <a:solidFill>
+                  <a:srgbClr val="F1C232"/>
+                </a:solidFill>
+              </a:rPr>
+              <a:t>FilmBank gives a user the ability to:</a:t>
             </a:r>
             <a:endParaRPr sz="1800">
-              <a:solidFill>
-                <a:srgbClr val="F1C232"/>
-              </a:solidFill>
-            </a:endParaRPr>
-          </a:p>
-        </p:txBody>
-      </p:sp>
-      <p:sp>
-        <p:nvSpPr>
-          <p:cNvPr id="84" name="Google Shape;84;p17"/>
-          <p:cNvSpPr txBox="1"/>
-          <p:nvPr/>
-        </p:nvSpPr>
-        <p:spPr>
-          <a:xfrm>
-            <a:off x="551100" y="1349775"/>
-            <a:ext cx="4600500" cy="2031900"/>
-          </a:xfrm>
-          <a:prstGeom prst="rect">
-            <a:avLst/>
-          </a:prstGeom>
-          <a:noFill/>
-          <a:ln>
-            <a:noFill/>
-          </a:ln>
-        </p:spPr>
-        <p:txBody>
-          <a:bodyPr anchorCtr="0" anchor="t" bIns="91425" lIns="91425" spcFirstLastPara="1" rIns="91425" wrap="square" tIns="91425">
-            <a:spAutoFit/>
-          </a:bodyPr>
-          <a:lstStyle/>
-          <a:p>
-            <a:pPr indent="-355600" lvl="0" marL="457200" rtl="0" algn="l">
-              <a:spcBef>
-                <a:spcPts val="0"/>
-              </a:spcBef>
-              <a:spcAft>
-                <a:spcPts val="0"/>
-              </a:spcAft>
-              <a:buClr>
-                <a:srgbClr val="F1C232"/>
-              </a:buClr>
-              <a:buSzPts val="2000"/>
-              <a:buChar char="●"/>
-            </a:pPr>
-            <a:r>
-              <a:rPr lang="en" sz="2000">
-                <a:solidFill>
-                  <a:srgbClr val="F1C232"/>
-                </a:solidFill>
-              </a:rPr>
-              <a:t>HTML</a:t>
-            </a:r>
-            <a:endParaRPr sz="2000">
               <a:solidFill>
                 <a:srgbClr val="F1C232"/>
               </a:solidFill>
             </a:endParaRPr>
           </a:p>
           <a:p>
-            <a:pPr indent="-355600" lvl="0" marL="457200" rtl="0" algn="l">
+            <a:pPr indent="-342900" lvl="0" marL="457200" rtl="0" algn="l">
               <a:spcBef>
                 <a:spcPts val="0"/>
               </a:spcBef>
@@ -9124,25 +9666,25 @@
               <a:buClr>
                 <a:srgbClr val="F1C232"/>
               </a:buClr>
-              <a:buSzPts val="2000"/>
+              <a:buSzPts val="1800"/>
               <a:buChar char="●"/>
             </a:pPr>
             <a:r>
-              <a:rPr lang="en" sz="2000">
+              <a:rPr lang="en" sz="1800">
                 <a:solidFill>
                   <a:srgbClr val="F1C232"/>
                 </a:solidFill>
               </a:rPr>
-              <a:t>Materialize CSS</a:t>
+              <a:t>Search for a film from any time in any genre</a:t>
             </a:r>
-            <a:endParaRPr sz="2000">
+            <a:endParaRPr sz="1800">
               <a:solidFill>
                 <a:srgbClr val="F1C232"/>
               </a:solidFill>
             </a:endParaRPr>
           </a:p>
           <a:p>
-            <a:pPr indent="-355600" lvl="0" marL="457200" rtl="0" algn="l">
+            <a:pPr indent="-342900" lvl="0" marL="457200" rtl="0" algn="l">
               <a:spcBef>
                 <a:spcPts val="0"/>
               </a:spcBef>
@@ -9152,25 +9694,25 @@
               <a:buClr>
                 <a:srgbClr val="F1C232"/>
               </a:buClr>
-              <a:buSzPts val="2000"/>
+              <a:buSzPts val="1800"/>
               <a:buChar char="●"/>
             </a:pPr>
             <a:r>
-              <a:rPr lang="en" sz="2000">
+              <a:rPr lang="en" sz="1800">
                 <a:solidFill>
                   <a:srgbClr val="F1C232"/>
                 </a:solidFill>
               </a:rPr>
-              <a:t>JavaScript</a:t>
+              <a:t>See a list of films that meet the search criteria</a:t>
             </a:r>
-            <a:endParaRPr sz="2000">
+            <a:endParaRPr sz="1800">
               <a:solidFill>
                 <a:srgbClr val="F1C232"/>
               </a:solidFill>
             </a:endParaRPr>
           </a:p>
           <a:p>
-            <a:pPr indent="-355600" lvl="0" marL="457200" rtl="0" algn="l">
+            <a:pPr indent="-342900" lvl="0" marL="457200" rtl="0" algn="l">
               <a:spcBef>
                 <a:spcPts val="0"/>
               </a:spcBef>
@@ -9180,25 +9722,25 @@
               <a:buClr>
                 <a:srgbClr val="F1C232"/>
               </a:buClr>
-              <a:buSzPts val="2000"/>
+              <a:buSzPts val="1800"/>
               <a:buChar char="●"/>
             </a:pPr>
             <a:r>
-              <a:rPr lang="en" sz="2000">
+              <a:rPr lang="en" sz="1800">
                 <a:solidFill>
                   <a:srgbClr val="F1C232"/>
                 </a:solidFill>
               </a:rPr>
-              <a:t>The Movie Database (TMDB) API </a:t>
+              <a:t>Get a description of any film including:</a:t>
             </a:r>
-            <a:endParaRPr sz="2000">
+            <a:endParaRPr sz="1800">
               <a:solidFill>
                 <a:srgbClr val="F1C232"/>
               </a:solidFill>
             </a:endParaRPr>
           </a:p>
           <a:p>
-            <a:pPr indent="-355600" lvl="0" marL="457200" rtl="0" algn="l">
+            <a:pPr indent="-342900" lvl="1" marL="914400" rtl="0" algn="l">
               <a:spcBef>
                 <a:spcPts val="0"/>
               </a:spcBef>
@@ -9208,18 +9750,130 @@
               <a:buClr>
                 <a:srgbClr val="F1C232"/>
               </a:buClr>
-              <a:buSzPts val="2000"/>
-              <a:buChar char="●"/>
+              <a:buSzPts val="1800"/>
+              <a:buChar char="○"/>
             </a:pPr>
             <a:r>
-              <a:rPr lang="en" sz="2000">
+              <a:rPr lang="en" sz="1800">
                 <a:solidFill>
                   <a:srgbClr val="F1C232"/>
                 </a:solidFill>
               </a:rPr>
-              <a:t>The New York Times Movie Review API</a:t>
+              <a:t>Description</a:t>
             </a:r>
-            <a:endParaRPr sz="2000">
+            <a:endParaRPr sz="1800">
+              <a:solidFill>
+                <a:srgbClr val="F1C232"/>
+              </a:solidFill>
+            </a:endParaRPr>
+          </a:p>
+          <a:p>
+            <a:pPr indent="-342900" lvl="1" marL="914400" rtl="0" algn="l">
+              <a:spcBef>
+                <a:spcPts val="0"/>
+              </a:spcBef>
+              <a:spcAft>
+                <a:spcPts val="0"/>
+              </a:spcAft>
+              <a:buClr>
+                <a:srgbClr val="F1C232"/>
+              </a:buClr>
+              <a:buSzPts val="1800"/>
+              <a:buChar char="○"/>
+            </a:pPr>
+            <a:r>
+              <a:rPr lang="en" sz="1800">
+                <a:solidFill>
+                  <a:srgbClr val="F1C232"/>
+                </a:solidFill>
+              </a:rPr>
+              <a:t>Release Date</a:t>
+            </a:r>
+            <a:endParaRPr sz="1800">
+              <a:solidFill>
+                <a:srgbClr val="F1C232"/>
+              </a:solidFill>
+            </a:endParaRPr>
+          </a:p>
+          <a:p>
+            <a:pPr indent="-342900" lvl="1" marL="914400" rtl="0" algn="l">
+              <a:spcBef>
+                <a:spcPts val="0"/>
+              </a:spcBef>
+              <a:spcAft>
+                <a:spcPts val="0"/>
+              </a:spcAft>
+              <a:buClr>
+                <a:srgbClr val="F1C232"/>
+              </a:buClr>
+              <a:buSzPts val="1800"/>
+              <a:buChar char="○"/>
+            </a:pPr>
+            <a:r>
+              <a:rPr lang="en" sz="1800">
+                <a:solidFill>
+                  <a:srgbClr val="F1C232"/>
+                </a:solidFill>
+              </a:rPr>
+              <a:t>Cast</a:t>
+            </a:r>
+            <a:endParaRPr sz="1800">
+              <a:solidFill>
+                <a:srgbClr val="F1C232"/>
+              </a:solidFill>
+            </a:endParaRPr>
+          </a:p>
+          <a:p>
+            <a:pPr indent="-342900" lvl="1" marL="914400" rtl="0" algn="l">
+              <a:spcBef>
+                <a:spcPts val="0"/>
+              </a:spcBef>
+              <a:spcAft>
+                <a:spcPts val="0"/>
+              </a:spcAft>
+              <a:buClr>
+                <a:srgbClr val="F1C232"/>
+              </a:buClr>
+              <a:buSzPts val="1800"/>
+              <a:buChar char="○"/>
+            </a:pPr>
+            <a:r>
+              <a:rPr lang="en" sz="1800">
+                <a:solidFill>
+                  <a:srgbClr val="F1C232"/>
+                </a:solidFill>
+              </a:rPr>
+              <a:t>Where It’s Streaming</a:t>
+            </a:r>
+            <a:endParaRPr sz="1800">
+              <a:solidFill>
+                <a:srgbClr val="F1C232"/>
+              </a:solidFill>
+            </a:endParaRPr>
+          </a:p>
+          <a:p>
+            <a:pPr indent="-342900" lvl="1" marL="914400" rtl="0" algn="l">
+              <a:spcBef>
+                <a:spcPts val="0"/>
+              </a:spcBef>
+              <a:spcAft>
+                <a:spcPts val="0"/>
+              </a:spcAft>
+              <a:buClr>
+                <a:srgbClr val="F1C232"/>
+              </a:buClr>
+              <a:buSzPts val="1800"/>
+              <a:buChar char="○"/>
+            </a:pPr>
+            <a:r>
+              <a:rPr lang="en" sz="1800">
+                <a:solidFill>
+                  <a:srgbClr val="F1C232"/>
+                </a:solidFill>
+              </a:rPr>
+              <a:t>New York Times Movie Review </a:t>
+            </a:r>
+            <a:endParaRPr sz="1800">
               <a:solidFill>
                 <a:srgbClr val="F1C232"/>
               </a:solidFill>
@@ -9240,7 +9894,7 @@
   <p:cSld>
     <p:spTree>
       <p:nvGrpSpPr>
-        <p:cNvPr id="88" name="Shape 88"/>
+        <p:cNvPr id="87" name="Shape 87"/>
         <p:cNvGrpSpPr/>
         <p:nvPr/>
       </p:nvGrpSpPr>
@@ -9254,7 +9908,7 @@
       </p:grpSpPr>
       <p:sp>
         <p:nvSpPr>
-          <p:cNvPr id="89" name="Google Shape;89;p18"/>
+          <p:cNvPr id="88" name="Google Shape;88;p18"/>
           <p:cNvSpPr txBox="1"/>
           <p:nvPr>
             <p:ph type="title"/>
@@ -9290,7 +9944,7 @@
                   <a:srgbClr val="F1C232"/>
                 </a:solidFill>
               </a:rPr>
-              <a:t>Collaboration &amp; Division of Work</a:t>
+              <a:t>Technology</a:t>
             </a:r>
             <a:endParaRPr>
               <a:solidFill>
@@ -9302,7 +9956,7 @@
       </p:sp>
       <p:pic>
         <p:nvPicPr>
-          <p:cNvPr id="90" name="Google Shape;90;p18"/>
+          <p:cNvPr id="89" name="Google Shape;89;p18"/>
           <p:cNvPicPr preferRelativeResize="0"/>
           <p:nvPr/>
         </p:nvPicPr>
@@ -9330,7 +9984,7 @@
       </p:pic>
       <p:sp>
         <p:nvSpPr>
-          <p:cNvPr id="91" name="Google Shape;91;p18"/>
+          <p:cNvPr id="90" name="Google Shape;90;p18"/>
           <p:cNvSpPr txBox="1"/>
           <p:nvPr/>
         </p:nvSpPr>
@@ -9375,14 +10029,14 @@
       </p:sp>
       <p:sp>
         <p:nvSpPr>
-          <p:cNvPr id="92" name="Google Shape;92;p18"/>
+          <p:cNvPr id="91" name="Google Shape;91;p18"/>
           <p:cNvSpPr txBox="1"/>
           <p:nvPr/>
         </p:nvSpPr>
         <p:spPr>
           <a:xfrm>
             <a:off x="551100" y="1349775"/>
-            <a:ext cx="7947000" cy="2709000"/>
+            <a:ext cx="4600500" cy="2031900"/>
           </a:xfrm>
           <a:prstGeom prst="rect">
             <a:avLst/>
@@ -9398,62 +10052,6 @@
           </a:bodyPr>
           <a:lstStyle/>
           <a:p>
-            <a:pPr indent="-368300" lvl="0" marL="457200" rtl="0" algn="l">
-              <a:spcBef>
-                <a:spcPts val="0"/>
-              </a:spcBef>
-              <a:spcAft>
-                <a:spcPts val="0"/>
-              </a:spcAft>
-              <a:buClr>
-                <a:srgbClr val="F1C232"/>
-              </a:buClr>
-              <a:buSzPts val="2200"/>
-              <a:buChar char="●"/>
-            </a:pPr>
-            <a:r>
-              <a:rPr lang="en" sz="2200">
-                <a:solidFill>
-                  <a:srgbClr val="F1C232"/>
-                </a:solidFill>
-              </a:rPr>
-              <a:t>Difficult on Small Project</a:t>
-            </a:r>
-            <a:endParaRPr sz="2200">
-              <a:solidFill>
-                <a:srgbClr val="F1C232"/>
-              </a:solidFill>
-            </a:endParaRPr>
-          </a:p>
-          <a:p>
-            <a:pPr indent="-368300" lvl="0" marL="457200" rtl="0" algn="l">
-              <a:spcBef>
-                <a:spcPts val="0"/>
-              </a:spcBef>
-              <a:spcAft>
-                <a:spcPts val="0"/>
-              </a:spcAft>
-              <a:buClr>
-                <a:srgbClr val="F1C232"/>
-              </a:buClr>
-              <a:buSzPts val="2200"/>
-              <a:buChar char="●"/>
-            </a:pPr>
-            <a:r>
-              <a:rPr lang="en" sz="2200">
-                <a:solidFill>
-                  <a:srgbClr val="F1C232"/>
-                </a:solidFill>
-              </a:rPr>
-              <a:t>Collaboration on Concept / CSS Framework Selection</a:t>
-            </a:r>
-            <a:endParaRPr sz="2200">
-              <a:solidFill>
-                <a:srgbClr val="F1C232"/>
-              </a:solidFill>
-            </a:endParaRPr>
-          </a:p>
-          <a:p>
             <a:pPr indent="-355600" lvl="0" marL="457200" rtl="0" algn="l">
               <a:spcBef>
                 <a:spcPts val="0"/>
@@ -9473,7 +10071,7 @@
                   <a:srgbClr val="F1C232"/>
                 </a:solidFill>
               </a:rPr>
-              <a:t>Roles (shared as much as possible)</a:t>
+              <a:t>HTML</a:t>
             </a:r>
             <a:endParaRPr sz="2000">
               <a:solidFill>
@@ -9482,7 +10080,7 @@
             </a:endParaRPr>
           </a:p>
           <a:p>
-            <a:pPr indent="-355600" lvl="1" marL="914400" rtl="0" algn="l">
+            <a:pPr indent="-355600" lvl="0" marL="457200" rtl="0" algn="l">
               <a:spcBef>
                 <a:spcPts val="0"/>
               </a:spcBef>
@@ -9493,7 +10091,7 @@
                 <a:srgbClr val="F1C232"/>
               </a:buClr>
               <a:buSzPts val="2000"/>
-              <a:buChar char="○"/>
+              <a:buChar char="●"/>
             </a:pPr>
             <a:r>
               <a:rPr lang="en" sz="2000">
@@ -9501,7 +10099,7 @@
                   <a:srgbClr val="F1C232"/>
                 </a:solidFill>
               </a:rPr>
-              <a:t>HTML Development</a:t>
+              <a:t>Materialize CSS</a:t>
             </a:r>
             <a:endParaRPr sz="2000">
               <a:solidFill>
@@ -9510,7 +10108,7 @@
             </a:endParaRPr>
           </a:p>
           <a:p>
-            <a:pPr indent="-355600" lvl="1" marL="914400" rtl="0" algn="l">
+            <a:pPr indent="-355600" lvl="0" marL="457200" rtl="0" algn="l">
               <a:spcBef>
                 <a:spcPts val="0"/>
               </a:spcBef>
@@ -9521,7 +10119,7 @@
                 <a:srgbClr val="F1C232"/>
               </a:buClr>
               <a:buSzPts val="2000"/>
-              <a:buChar char="○"/>
+              <a:buChar char="●"/>
             </a:pPr>
             <a:r>
               <a:rPr lang="en" sz="2000">
@@ -9529,7 +10127,7 @@
                   <a:srgbClr val="F1C232"/>
                 </a:solidFill>
               </a:rPr>
-              <a:t>JavaScript Development</a:t>
+              <a:t>JavaScript</a:t>
             </a:r>
             <a:endParaRPr sz="2000">
               <a:solidFill>
@@ -9538,7 +10136,7 @@
             </a:endParaRPr>
           </a:p>
           <a:p>
-            <a:pPr indent="-355600" lvl="1" marL="914400" rtl="0" algn="l">
+            <a:pPr indent="-355600" lvl="0" marL="457200" rtl="0" algn="l">
               <a:spcBef>
                 <a:spcPts val="0"/>
               </a:spcBef>
@@ -9549,7 +10147,7 @@
                 <a:srgbClr val="F1C232"/>
               </a:buClr>
               <a:buSzPts val="2000"/>
-              <a:buChar char="○"/>
+              <a:buChar char="●"/>
             </a:pPr>
             <a:r>
               <a:rPr lang="en" sz="2000">
@@ -9557,7 +10155,7 @@
                   <a:srgbClr val="F1C232"/>
                 </a:solidFill>
               </a:rPr>
-              <a:t>Incorporation of Materialize </a:t>
+              <a:t>The Movie Database (TMDB) API </a:t>
             </a:r>
             <a:endParaRPr sz="2000">
               <a:solidFill>
@@ -9566,7 +10164,7 @@
             </a:endParaRPr>
           </a:p>
           <a:p>
-            <a:pPr indent="-355600" lvl="1" marL="914400" rtl="0" algn="l">
+            <a:pPr indent="-355600" lvl="0" marL="457200" rtl="0" algn="l">
               <a:spcBef>
                 <a:spcPts val="0"/>
               </a:spcBef>
@@ -9577,7 +10175,7 @@
                 <a:srgbClr val="F1C232"/>
               </a:buClr>
               <a:buSzPts val="2000"/>
-              <a:buChar char="○"/>
+              <a:buChar char="●"/>
             </a:pPr>
             <a:r>
               <a:rPr lang="en" sz="2000">
@@ -9585,35 +10183,7 @@
                   <a:srgbClr val="F1C232"/>
                 </a:solidFill>
               </a:rPr>
-              <a:t>Slide / README Development</a:t>
-            </a:r>
-            <a:endParaRPr sz="2000">
-              <a:solidFill>
-                <a:srgbClr val="F1C232"/>
-              </a:solidFill>
-            </a:endParaRPr>
-          </a:p>
-          <a:p>
-            <a:pPr indent="-355600" lvl="1" marL="914400" rtl="0" algn="l">
-              <a:spcBef>
-                <a:spcPts val="0"/>
-              </a:spcBef>
-              <a:spcAft>
-                <a:spcPts val="0"/>
-              </a:spcAft>
-              <a:buClr>
-                <a:srgbClr val="F1C232"/>
-              </a:buClr>
-              <a:buSzPts val="2000"/>
-              <a:buChar char="○"/>
-            </a:pPr>
-            <a:r>
-              <a:rPr lang="en" sz="2000">
-                <a:solidFill>
-                  <a:srgbClr val="F1C232"/>
-                </a:solidFill>
-              </a:rPr>
-              <a:t>Project Management</a:t>
+              <a:t>The New York Times Movie Review API</a:t>
             </a:r>
             <a:endParaRPr sz="2000">
               <a:solidFill>
@@ -9636,7 +10206,7 @@
   <p:cSld>
     <p:spTree>
       <p:nvGrpSpPr>
-        <p:cNvPr id="96" name="Shape 96"/>
+        <p:cNvPr id="95" name="Shape 95"/>
         <p:cNvGrpSpPr/>
         <p:nvPr/>
       </p:nvGrpSpPr>
@@ -9650,7 +10220,7 @@
       </p:grpSpPr>
       <p:sp>
         <p:nvSpPr>
-          <p:cNvPr id="97" name="Google Shape;97;p19"/>
+          <p:cNvPr id="96" name="Google Shape;96;p19"/>
           <p:cNvSpPr txBox="1"/>
           <p:nvPr>
             <p:ph type="title"/>
@@ -9686,7 +10256,7 @@
                   <a:srgbClr val="F1C232"/>
                 </a:solidFill>
               </a:rPr>
-              <a:t>Challenges We Overcame</a:t>
+              <a:t>Collaboration &amp; Division of Work</a:t>
             </a:r>
             <a:endParaRPr>
               <a:solidFill>
@@ -9698,7 +10268,7 @@
       </p:sp>
       <p:pic>
         <p:nvPicPr>
-          <p:cNvPr id="98" name="Google Shape;98;p19"/>
+          <p:cNvPr id="97" name="Google Shape;97;p19"/>
           <p:cNvPicPr preferRelativeResize="0"/>
           <p:nvPr/>
         </p:nvPicPr>
@@ -9726,7 +10296,7 @@
       </p:pic>
       <p:sp>
         <p:nvSpPr>
-          <p:cNvPr id="99" name="Google Shape;99;p19"/>
+          <p:cNvPr id="98" name="Google Shape;98;p19"/>
           <p:cNvSpPr txBox="1"/>
           <p:nvPr/>
         </p:nvSpPr>
@@ -9771,7 +10341,403 @@
       </p:sp>
       <p:sp>
         <p:nvSpPr>
-          <p:cNvPr id="100" name="Google Shape;100;p19"/>
+          <p:cNvPr id="99" name="Google Shape;99;p19"/>
+          <p:cNvSpPr txBox="1"/>
+          <p:nvPr/>
+        </p:nvSpPr>
+        <p:spPr>
+          <a:xfrm>
+            <a:off x="551100" y="1349775"/>
+            <a:ext cx="7947000" cy="2709000"/>
+          </a:xfrm>
+          <a:prstGeom prst="rect">
+            <a:avLst/>
+          </a:prstGeom>
+          <a:noFill/>
+          <a:ln>
+            <a:noFill/>
+          </a:ln>
+        </p:spPr>
+        <p:txBody>
+          <a:bodyPr anchorCtr="0" anchor="t" bIns="91425" lIns="91425" spcFirstLastPara="1" rIns="91425" wrap="square" tIns="91425">
+            <a:spAutoFit/>
+          </a:bodyPr>
+          <a:lstStyle/>
+          <a:p>
+            <a:pPr indent="-368300" lvl="0" marL="457200" rtl="0" algn="l">
+              <a:spcBef>
+                <a:spcPts val="0"/>
+              </a:spcBef>
+              <a:spcAft>
+                <a:spcPts val="0"/>
+              </a:spcAft>
+              <a:buClr>
+                <a:srgbClr val="F1C232"/>
+              </a:buClr>
+              <a:buSzPts val="2200"/>
+              <a:buChar char="●"/>
+            </a:pPr>
+            <a:r>
+              <a:rPr lang="en" sz="2200">
+                <a:solidFill>
+                  <a:srgbClr val="F1C232"/>
+                </a:solidFill>
+              </a:rPr>
+              <a:t>Difficult on Small Project</a:t>
+            </a:r>
+            <a:endParaRPr sz="2200">
+              <a:solidFill>
+                <a:srgbClr val="F1C232"/>
+              </a:solidFill>
+            </a:endParaRPr>
+          </a:p>
+          <a:p>
+            <a:pPr indent="-368300" lvl="0" marL="457200" rtl="0" algn="l">
+              <a:spcBef>
+                <a:spcPts val="0"/>
+              </a:spcBef>
+              <a:spcAft>
+                <a:spcPts val="0"/>
+              </a:spcAft>
+              <a:buClr>
+                <a:srgbClr val="F1C232"/>
+              </a:buClr>
+              <a:buSzPts val="2200"/>
+              <a:buChar char="●"/>
+            </a:pPr>
+            <a:r>
+              <a:rPr lang="en" sz="2200">
+                <a:solidFill>
+                  <a:srgbClr val="F1C232"/>
+                </a:solidFill>
+              </a:rPr>
+              <a:t>Collaboration on Concept / CSS Framework Selection</a:t>
+            </a:r>
+            <a:endParaRPr sz="2200">
+              <a:solidFill>
+                <a:srgbClr val="F1C232"/>
+              </a:solidFill>
+            </a:endParaRPr>
+          </a:p>
+          <a:p>
+            <a:pPr indent="-355600" lvl="0" marL="457200" rtl="0" algn="l">
+              <a:spcBef>
+                <a:spcPts val="0"/>
+              </a:spcBef>
+              <a:spcAft>
+                <a:spcPts val="0"/>
+              </a:spcAft>
+              <a:buClr>
+                <a:srgbClr val="F1C232"/>
+              </a:buClr>
+              <a:buSzPts val="2000"/>
+              <a:buChar char="●"/>
+            </a:pPr>
+            <a:r>
+              <a:rPr lang="en" sz="2000">
+                <a:solidFill>
+                  <a:srgbClr val="F1C232"/>
+                </a:solidFill>
+              </a:rPr>
+              <a:t>Roles (shared as much as possible)</a:t>
+            </a:r>
+            <a:endParaRPr sz="2000">
+              <a:solidFill>
+                <a:srgbClr val="F1C232"/>
+              </a:solidFill>
+            </a:endParaRPr>
+          </a:p>
+          <a:p>
+            <a:pPr indent="-355600" lvl="1" marL="914400" rtl="0" algn="l">
+              <a:spcBef>
+                <a:spcPts val="0"/>
+              </a:spcBef>
+              <a:spcAft>
+                <a:spcPts val="0"/>
+              </a:spcAft>
+              <a:buClr>
+                <a:srgbClr val="F1C232"/>
+              </a:buClr>
+              <a:buSzPts val="2000"/>
+              <a:buChar char="○"/>
+            </a:pPr>
+            <a:r>
+              <a:rPr lang="en" sz="2000">
+                <a:solidFill>
+                  <a:srgbClr val="F1C232"/>
+                </a:solidFill>
+              </a:rPr>
+              <a:t>HTML Development</a:t>
+            </a:r>
+            <a:endParaRPr sz="2000">
+              <a:solidFill>
+                <a:srgbClr val="F1C232"/>
+              </a:solidFill>
+            </a:endParaRPr>
+          </a:p>
+          <a:p>
+            <a:pPr indent="-355600" lvl="1" marL="914400" rtl="0" algn="l">
+              <a:spcBef>
+                <a:spcPts val="0"/>
+              </a:spcBef>
+              <a:spcAft>
+                <a:spcPts val="0"/>
+              </a:spcAft>
+              <a:buClr>
+                <a:srgbClr val="F1C232"/>
+              </a:buClr>
+              <a:buSzPts val="2000"/>
+              <a:buChar char="○"/>
+            </a:pPr>
+            <a:r>
+              <a:rPr lang="en" sz="2000">
+                <a:solidFill>
+                  <a:srgbClr val="F1C232"/>
+                </a:solidFill>
+              </a:rPr>
+              <a:t>JavaScript Development</a:t>
+            </a:r>
+            <a:endParaRPr sz="2000">
+              <a:solidFill>
+                <a:srgbClr val="F1C232"/>
+              </a:solidFill>
+            </a:endParaRPr>
+          </a:p>
+          <a:p>
+            <a:pPr indent="-355600" lvl="1" marL="914400" rtl="0" algn="l">
+              <a:spcBef>
+                <a:spcPts val="0"/>
+              </a:spcBef>
+              <a:spcAft>
+                <a:spcPts val="0"/>
+              </a:spcAft>
+              <a:buClr>
+                <a:srgbClr val="F1C232"/>
+              </a:buClr>
+              <a:buSzPts val="2000"/>
+              <a:buChar char="○"/>
+            </a:pPr>
+            <a:r>
+              <a:rPr lang="en" sz="2000">
+                <a:solidFill>
+                  <a:srgbClr val="F1C232"/>
+                </a:solidFill>
+              </a:rPr>
+              <a:t>Incorporation of Materialize </a:t>
+            </a:r>
+            <a:endParaRPr sz="2000">
+              <a:solidFill>
+                <a:srgbClr val="F1C232"/>
+              </a:solidFill>
+            </a:endParaRPr>
+          </a:p>
+          <a:p>
+            <a:pPr indent="-355600" lvl="1" marL="914400" rtl="0" algn="l">
+              <a:spcBef>
+                <a:spcPts val="0"/>
+              </a:spcBef>
+              <a:spcAft>
+                <a:spcPts val="0"/>
+              </a:spcAft>
+              <a:buClr>
+                <a:srgbClr val="F1C232"/>
+              </a:buClr>
+              <a:buSzPts val="2000"/>
+              <a:buChar char="○"/>
+            </a:pPr>
+            <a:r>
+              <a:rPr lang="en" sz="2000">
+                <a:solidFill>
+                  <a:srgbClr val="F1C232"/>
+                </a:solidFill>
+              </a:rPr>
+              <a:t>Slide / README Development</a:t>
+            </a:r>
+            <a:endParaRPr sz="2000">
+              <a:solidFill>
+                <a:srgbClr val="F1C232"/>
+              </a:solidFill>
+            </a:endParaRPr>
+          </a:p>
+          <a:p>
+            <a:pPr indent="-355600" lvl="1" marL="914400" rtl="0" algn="l">
+              <a:spcBef>
+                <a:spcPts val="0"/>
+              </a:spcBef>
+              <a:spcAft>
+                <a:spcPts val="0"/>
+              </a:spcAft>
+              <a:buClr>
+                <a:srgbClr val="F1C232"/>
+              </a:buClr>
+              <a:buSzPts val="2000"/>
+              <a:buChar char="○"/>
+            </a:pPr>
+            <a:r>
+              <a:rPr lang="en" sz="2000">
+                <a:solidFill>
+                  <a:srgbClr val="F1C232"/>
+                </a:solidFill>
+              </a:rPr>
+              <a:t>Project Management</a:t>
+            </a:r>
+            <a:endParaRPr sz="2000">
+              <a:solidFill>
+                <a:srgbClr val="F1C232"/>
+              </a:solidFill>
+            </a:endParaRPr>
+          </a:p>
+        </p:txBody>
+      </p:sp>
+    </p:spTree>
+  </p:cSld>
+  <p:clrMapOvr>
+    <a:masterClrMapping/>
+  </p:clrMapOvr>
+</p:sld>
+</file>
+
+<file path=ppt/slides/slide8.xml><?xml version="1.0" encoding="utf-8"?>
+<p:sld xmlns:a="http://schemas.openxmlformats.org/drawingml/2006/main" xmlns:r="http://schemas.openxmlformats.org/officeDocument/2006/relationships" xmlns:mc="http://schemas.openxmlformats.org/markup-compatibility/2006" xmlns:mv="urn:schemas-microsoft-com:mac:vml" xmlns:p="http://schemas.openxmlformats.org/presentationml/2006/main" xmlns:c="http://schemas.openxmlformats.org/drawingml/2006/chart" xmlns:dgm="http://schemas.openxmlformats.org/drawingml/2006/diagram" xmlns:o="urn:schemas-microsoft-com:office:office" xmlns:v="urn:schemas-microsoft-com:vml" xmlns:pvml="urn:schemas-microsoft-com:office:powerpoint" xmlns:com="http://schemas.openxmlformats.org/drawingml/2006/compatibility" xmlns:p14="http://schemas.microsoft.com/office/powerpoint/2010/main" xmlns:p15="http://schemas.microsoft.com/office/powerpoint/2012/main" xmlns:ahyp="http://schemas.microsoft.com/office/drawing/2018/hyperlinkcolor">
+  <p:cSld>
+    <p:spTree>
+      <p:nvGrpSpPr>
+        <p:cNvPr id="103" name="Shape 103"/>
+        <p:cNvGrpSpPr/>
+        <p:nvPr/>
+      </p:nvGrpSpPr>
+      <p:grpSpPr>
+        <a:xfrm>
+          <a:off x="0" y="0"/>
+          <a:ext cx="0" cy="0"/>
+          <a:chOff x="0" y="0"/>
+          <a:chExt cx="0" cy="0"/>
+        </a:xfrm>
+      </p:grpSpPr>
+      <p:sp>
+        <p:nvSpPr>
+          <p:cNvPr id="104" name="Google Shape;104;p20"/>
+          <p:cNvSpPr txBox="1"/>
+          <p:nvPr>
+            <p:ph type="title"/>
+          </p:nvPr>
+        </p:nvSpPr>
+        <p:spPr>
+          <a:xfrm>
+            <a:off x="311700" y="445025"/>
+            <a:ext cx="8520600" cy="572700"/>
+          </a:xfrm>
+          <a:prstGeom prst="rect">
+            <a:avLst/>
+          </a:prstGeom>
+        </p:spPr>
+        <p:txBody>
+          <a:bodyPr anchorCtr="0" anchor="t" bIns="91425" lIns="91425" spcFirstLastPara="1" rIns="91425" wrap="square" tIns="91425">
+            <a:normAutofit fontScale="90000"/>
+          </a:bodyPr>
+          <a:lstStyle/>
+          <a:p>
+            <a:pPr indent="0" lvl="0" marL="0" rtl="0" algn="l">
+              <a:spcBef>
+                <a:spcPts val="0"/>
+              </a:spcBef>
+              <a:spcAft>
+                <a:spcPts val="0"/>
+              </a:spcAft>
+              <a:buNone/>
+            </a:pPr>
+            <a:r>
+              <a:rPr lang="en">
+                <a:solidFill>
+                  <a:srgbClr val="F1C232"/>
+                </a:solidFill>
+              </a:rPr>
+              <a:t>Challenges We Overcame</a:t>
+            </a:r>
+            <a:endParaRPr>
+              <a:solidFill>
+                <a:srgbClr val="F1C232"/>
+              </a:solidFill>
+            </a:endParaRPr>
+          </a:p>
+        </p:txBody>
+      </p:sp>
+      <p:pic>
+        <p:nvPicPr>
+          <p:cNvPr id="105" name="Google Shape;105;p20"/>
+          <p:cNvPicPr preferRelativeResize="0"/>
+          <p:nvPr/>
+        </p:nvPicPr>
+        <p:blipFill>
+          <a:blip r:embed="rId3">
+            <a:alphaModFix/>
+          </a:blip>
+          <a:stretch>
+            <a:fillRect/>
+          </a:stretch>
+        </p:blipFill>
+        <p:spPr>
+          <a:xfrm>
+            <a:off x="4672350" y="2691550"/>
+            <a:ext cx="3904651" cy="2017401"/>
+          </a:xfrm>
+          <a:prstGeom prst="rect">
+            <a:avLst/>
+          </a:prstGeom>
+          <a:noFill/>
+          <a:ln>
+            <a:noFill/>
+          </a:ln>
+        </p:spPr>
+      </p:pic>
+      <p:sp>
+        <p:nvSpPr>
+          <p:cNvPr id="106" name="Google Shape;106;p20"/>
+          <p:cNvSpPr txBox="1"/>
+          <p:nvPr/>
+        </p:nvSpPr>
+        <p:spPr>
+          <a:xfrm>
+            <a:off x="654925" y="1221975"/>
+            <a:ext cx="4600500" cy="461700"/>
+          </a:xfrm>
+          <a:prstGeom prst="rect">
+            <a:avLst/>
+          </a:prstGeom>
+          <a:noFill/>
+          <a:ln>
+            <a:noFill/>
+          </a:ln>
+        </p:spPr>
+        <p:txBody>
+          <a:bodyPr anchorCtr="0" anchor="t" bIns="91425" lIns="91425" spcFirstLastPara="1" rIns="91425" wrap="square" tIns="91425">
+            <a:spAutoFit/>
+          </a:bodyPr>
+          <a:lstStyle/>
+          <a:p>
+            <a:pPr indent="0" lvl="0" marL="0" rtl="0" algn="l">
+              <a:spcBef>
+                <a:spcPts val="0"/>
+              </a:spcBef>
+              <a:spcAft>
+                <a:spcPts val="0"/>
+              </a:spcAft>
+              <a:buNone/>
+            </a:pPr>
+            <a:r>
+              <a:t/>
+            </a:r>
+            <a:endParaRPr sz="1800">
+              <a:solidFill>
+                <a:srgbClr val="F1C232"/>
+              </a:solidFill>
+            </a:endParaRPr>
+          </a:p>
+        </p:txBody>
+      </p:sp>
+      <p:sp>
+        <p:nvSpPr>
+          <p:cNvPr id="107" name="Google Shape;107;p20"/>
           <p:cNvSpPr txBox="1"/>
           <p:nvPr/>
         </p:nvSpPr>
@@ -9915,12 +10881,12 @@
 </p:sld>
 </file>
 
-<file path=ppt/slides/slide8.xml><?xml version="1.0" encoding="utf-8"?>
+<file path=ppt/slides/slide9.xml><?xml version="1.0" encoding="utf-8"?>
 <p:sld xmlns:a="http://schemas.openxmlformats.org/drawingml/2006/main" xmlns:r="http://schemas.openxmlformats.org/officeDocument/2006/relationships" xmlns:mc="http://schemas.openxmlformats.org/markup-compatibility/2006" xmlns:mv="urn:schemas-microsoft-com:mac:vml" xmlns:p="http://schemas.openxmlformats.org/presentationml/2006/main" xmlns:c="http://schemas.openxmlformats.org/drawingml/2006/chart" xmlns:dgm="http://schemas.openxmlformats.org/drawingml/2006/diagram" xmlns:o="urn:schemas-microsoft-com:office:office" xmlns:v="urn:schemas-microsoft-com:vml" xmlns:pvml="urn:schemas-microsoft-com:office:powerpoint" xmlns:com="http://schemas.openxmlformats.org/drawingml/2006/compatibility" xmlns:p14="http://schemas.microsoft.com/office/powerpoint/2010/main" xmlns:p15="http://schemas.microsoft.com/office/powerpoint/2012/main" xmlns:ahyp="http://schemas.microsoft.com/office/drawing/2018/hyperlinkcolor">
   <p:cSld>
     <p:spTree>
       <p:nvGrpSpPr>
-        <p:cNvPr id="104" name="Shape 104"/>
+        <p:cNvPr id="111" name="Shape 111"/>
         <p:cNvGrpSpPr/>
         <p:nvPr/>
       </p:nvGrpSpPr>
@@ -9934,7 +10900,7 @@
       </p:grpSpPr>
       <p:pic>
         <p:nvPicPr>
-          <p:cNvPr id="105" name="Google Shape;105;p20"/>
+          <p:cNvPr id="112" name="Google Shape;112;p21"/>
           <p:cNvPicPr preferRelativeResize="0"/>
           <p:nvPr/>
         </p:nvPicPr>
@@ -9962,7 +10928,7 @@
       </p:pic>
       <p:sp>
         <p:nvSpPr>
-          <p:cNvPr id="106" name="Google Shape;106;p20"/>
+          <p:cNvPr id="113" name="Google Shape;113;p21"/>
           <p:cNvSpPr txBox="1"/>
           <p:nvPr/>
         </p:nvSpPr>
@@ -10018,383 +10984,286 @@
 </p:sld>
 </file>
 
-<file path=ppt/slides/slide9.xml><?xml version="1.0" encoding="utf-8"?>
-<p:sld xmlns:a="http://schemas.openxmlformats.org/drawingml/2006/main" xmlns:r="http://schemas.openxmlformats.org/officeDocument/2006/relationships" xmlns:mc="http://schemas.openxmlformats.org/markup-compatibility/2006" xmlns:mv="urn:schemas-microsoft-com:mac:vml" xmlns:p="http://schemas.openxmlformats.org/presentationml/2006/main" xmlns:c="http://schemas.openxmlformats.org/drawingml/2006/chart" xmlns:dgm="http://schemas.openxmlformats.org/drawingml/2006/diagram" xmlns:o="urn:schemas-microsoft-com:office:office" xmlns:v="urn:schemas-microsoft-com:vml" xmlns:pvml="urn:schemas-microsoft-com:office:powerpoint" xmlns:com="http://schemas.openxmlformats.org/drawingml/2006/compatibility" xmlns:p14="http://schemas.microsoft.com/office/powerpoint/2010/main" xmlns:p15="http://schemas.microsoft.com/office/powerpoint/2012/main" xmlns:ahyp="http://schemas.microsoft.com/office/drawing/2018/hyperlinkcolor">
-  <p:cSld>
-    <p:spTree>
-      <p:nvGrpSpPr>
-        <p:cNvPr id="110" name="Shape 110"/>
-        <p:cNvGrpSpPr/>
-        <p:nvPr/>
-      </p:nvGrpSpPr>
-      <p:grpSpPr>
-        <a:xfrm>
-          <a:off x="0" y="0"/>
-          <a:ext cx="0" cy="0"/>
-          <a:chOff x="0" y="0"/>
-          <a:chExt cx="0" cy="0"/>
-        </a:xfrm>
-      </p:grpSpPr>
-      <p:sp>
-        <p:nvSpPr>
-          <p:cNvPr id="111" name="Google Shape;111;p21"/>
-          <p:cNvSpPr txBox="1"/>
-          <p:nvPr>
-            <p:ph type="title"/>
-          </p:nvPr>
-        </p:nvSpPr>
-        <p:spPr>
-          <a:xfrm>
-            <a:off x="311700" y="445025"/>
-            <a:ext cx="8520600" cy="572700"/>
-          </a:xfrm>
-          <a:prstGeom prst="rect">
-            <a:avLst/>
-          </a:prstGeom>
-        </p:spPr>
-        <p:txBody>
-          <a:bodyPr anchorCtr="0" anchor="t" bIns="91425" lIns="91425" spcFirstLastPara="1" rIns="91425" wrap="square" tIns="91425">
-            <a:normAutofit fontScale="90000"/>
-          </a:bodyPr>
-          <a:lstStyle/>
-          <a:p>
-            <a:pPr indent="0" lvl="0" marL="0" rtl="0" algn="l">
-              <a:spcBef>
-                <a:spcPts val="0"/>
-              </a:spcBef>
-              <a:spcAft>
-                <a:spcPts val="0"/>
-              </a:spcAft>
-              <a:buNone/>
-            </a:pPr>
-            <a:r>
-              <a:rPr lang="en">
-                <a:solidFill>
-                  <a:srgbClr val="F1C232"/>
-                </a:solidFill>
-              </a:rPr>
-              <a:t>Enhancements / Future Development</a:t>
-            </a:r>
-            <a:endParaRPr>
-              <a:solidFill>
-                <a:srgbClr val="F1C232"/>
-              </a:solidFill>
-            </a:endParaRPr>
-          </a:p>
-        </p:txBody>
-      </p:sp>
-      <p:pic>
-        <p:nvPicPr>
-          <p:cNvPr id="112" name="Google Shape;112;p21"/>
-          <p:cNvPicPr preferRelativeResize="0"/>
-          <p:nvPr/>
-        </p:nvPicPr>
-        <p:blipFill>
-          <a:blip r:embed="rId3">
-            <a:alphaModFix/>
-          </a:blip>
-          <a:stretch>
-            <a:fillRect/>
-          </a:stretch>
-        </p:blipFill>
-        <p:spPr>
-          <a:xfrm>
-            <a:off x="4672350" y="2691550"/>
-            <a:ext cx="3904651" cy="2017401"/>
-          </a:xfrm>
-          <a:prstGeom prst="rect">
-            <a:avLst/>
-          </a:prstGeom>
-          <a:noFill/>
-          <a:ln>
-            <a:noFill/>
-          </a:ln>
-        </p:spPr>
-      </p:pic>
-      <p:sp>
-        <p:nvSpPr>
-          <p:cNvPr id="113" name="Google Shape;113;p21"/>
-          <p:cNvSpPr txBox="1"/>
-          <p:nvPr/>
-        </p:nvSpPr>
-        <p:spPr>
-          <a:xfrm>
-            <a:off x="654925" y="1221975"/>
-            <a:ext cx="4600500" cy="461700"/>
-          </a:xfrm>
-          <a:prstGeom prst="rect">
-            <a:avLst/>
-          </a:prstGeom>
-          <a:noFill/>
-          <a:ln>
-            <a:noFill/>
-          </a:ln>
-        </p:spPr>
-        <p:txBody>
-          <a:bodyPr anchorCtr="0" anchor="t" bIns="91425" lIns="91425" spcFirstLastPara="1" rIns="91425" wrap="square" tIns="91425">
-            <a:spAutoFit/>
-          </a:bodyPr>
-          <a:lstStyle/>
-          <a:p>
-            <a:pPr indent="0" lvl="0" marL="0" rtl="0" algn="l">
-              <a:spcBef>
-                <a:spcPts val="0"/>
-              </a:spcBef>
-              <a:spcAft>
-                <a:spcPts val="0"/>
-              </a:spcAft>
-              <a:buNone/>
-            </a:pPr>
-            <a:r>
-              <a:t/>
-            </a:r>
-            <a:endParaRPr sz="1800">
-              <a:solidFill>
-                <a:srgbClr val="F1C232"/>
-              </a:solidFill>
-            </a:endParaRPr>
-          </a:p>
-        </p:txBody>
-      </p:sp>
-      <p:sp>
-        <p:nvSpPr>
-          <p:cNvPr id="114" name="Google Shape;114;p21"/>
-          <p:cNvSpPr txBox="1"/>
-          <p:nvPr/>
-        </p:nvSpPr>
-        <p:spPr>
-          <a:xfrm>
-            <a:off x="551100" y="1349775"/>
-            <a:ext cx="7947000" cy="2662800"/>
-          </a:xfrm>
-          <a:prstGeom prst="rect">
-            <a:avLst/>
-          </a:prstGeom>
-          <a:noFill/>
-          <a:ln>
-            <a:noFill/>
-          </a:ln>
-        </p:spPr>
-        <p:txBody>
-          <a:bodyPr anchorCtr="0" anchor="t" bIns="91425" lIns="91425" spcFirstLastPara="1" rIns="91425" wrap="square" tIns="91425">
-            <a:spAutoFit/>
-          </a:bodyPr>
-          <a:lstStyle/>
-          <a:p>
-            <a:pPr indent="-374650" lvl="0" marL="457200" rtl="0" algn="l">
-              <a:spcBef>
-                <a:spcPts val="0"/>
-              </a:spcBef>
-              <a:spcAft>
-                <a:spcPts val="0"/>
-              </a:spcAft>
-              <a:buClr>
-                <a:srgbClr val="F1C232"/>
-              </a:buClr>
-              <a:buSzPts val="2300"/>
-              <a:buChar char="●"/>
-            </a:pPr>
-            <a:r>
-              <a:rPr lang="en" sz="2300">
-                <a:solidFill>
-                  <a:srgbClr val="F1C232"/>
-                </a:solidFill>
-              </a:rPr>
-              <a:t>Incorporating</a:t>
-            </a:r>
-            <a:r>
-              <a:rPr lang="en" sz="2300">
-                <a:solidFill>
-                  <a:srgbClr val="F1C232"/>
-                </a:solidFill>
-              </a:rPr>
-              <a:t> Additional Data</a:t>
-            </a:r>
-            <a:endParaRPr sz="2300">
-              <a:solidFill>
-                <a:srgbClr val="F1C232"/>
-              </a:solidFill>
-            </a:endParaRPr>
-          </a:p>
-          <a:p>
-            <a:pPr indent="-374650" lvl="1" marL="914400" rtl="0" algn="l">
-              <a:spcBef>
-                <a:spcPts val="0"/>
-              </a:spcBef>
-              <a:spcAft>
-                <a:spcPts val="0"/>
-              </a:spcAft>
-              <a:buClr>
-                <a:srgbClr val="F1C232"/>
-              </a:buClr>
-              <a:buSzPts val="2300"/>
-              <a:buChar char="○"/>
-            </a:pPr>
-            <a:r>
-              <a:rPr lang="en" sz="2300">
-                <a:solidFill>
-                  <a:srgbClr val="F1C232"/>
-                </a:solidFill>
-              </a:rPr>
-              <a:t>TV Shows</a:t>
-            </a:r>
-            <a:endParaRPr sz="2300">
-              <a:solidFill>
-                <a:srgbClr val="F1C232"/>
-              </a:solidFill>
-            </a:endParaRPr>
-          </a:p>
-          <a:p>
-            <a:pPr indent="-374650" lvl="1" marL="914400" rtl="0" algn="l">
-              <a:spcBef>
-                <a:spcPts val="0"/>
-              </a:spcBef>
-              <a:spcAft>
-                <a:spcPts val="0"/>
-              </a:spcAft>
-              <a:buClr>
-                <a:srgbClr val="F1C232"/>
-              </a:buClr>
-              <a:buSzPts val="2300"/>
-              <a:buChar char="○"/>
-            </a:pPr>
-            <a:r>
-              <a:rPr lang="en" sz="2300">
-                <a:solidFill>
-                  <a:srgbClr val="F1C232"/>
-                </a:solidFill>
-              </a:rPr>
-              <a:t>Links  to Streaming Providers</a:t>
-            </a:r>
-            <a:endParaRPr sz="2300">
-              <a:solidFill>
-                <a:srgbClr val="F1C232"/>
-              </a:solidFill>
-            </a:endParaRPr>
-          </a:p>
-          <a:p>
-            <a:pPr indent="-374650" lvl="1" marL="914400" rtl="0" algn="l">
-              <a:spcBef>
-                <a:spcPts val="0"/>
-              </a:spcBef>
-              <a:spcAft>
-                <a:spcPts val="0"/>
-              </a:spcAft>
-              <a:buClr>
-                <a:srgbClr val="F1C232"/>
-              </a:buClr>
-              <a:buSzPts val="2300"/>
-              <a:buChar char="○"/>
-            </a:pPr>
-            <a:r>
-              <a:rPr lang="en" sz="2300">
-                <a:solidFill>
-                  <a:srgbClr val="F1C232"/>
-                </a:solidFill>
-              </a:rPr>
-              <a:t>Film Trailers</a:t>
-            </a:r>
-            <a:endParaRPr sz="2300">
-              <a:solidFill>
-                <a:srgbClr val="F1C232"/>
-              </a:solidFill>
-            </a:endParaRPr>
-          </a:p>
-          <a:p>
-            <a:pPr indent="-374650" lvl="1" marL="914400" rtl="0" algn="l">
-              <a:spcBef>
-                <a:spcPts val="0"/>
-              </a:spcBef>
-              <a:spcAft>
-                <a:spcPts val="0"/>
-              </a:spcAft>
-              <a:buClr>
-                <a:srgbClr val="F1C232"/>
-              </a:buClr>
-              <a:buSzPts val="2300"/>
-              <a:buChar char="○"/>
-            </a:pPr>
-            <a:r>
-              <a:rPr lang="en" sz="2300">
-                <a:solidFill>
-                  <a:srgbClr val="F1C232"/>
-                </a:solidFill>
-              </a:rPr>
-              <a:t>Actor Bios</a:t>
-            </a:r>
-            <a:endParaRPr sz="2300">
-              <a:solidFill>
-                <a:srgbClr val="F1C232"/>
-              </a:solidFill>
-            </a:endParaRPr>
-          </a:p>
-          <a:p>
-            <a:pPr indent="-374650" lvl="1" marL="914400" rtl="0" algn="l">
-              <a:spcBef>
-                <a:spcPts val="0"/>
-              </a:spcBef>
-              <a:spcAft>
-                <a:spcPts val="0"/>
-              </a:spcAft>
-              <a:buClr>
-                <a:srgbClr val="F1C232"/>
-              </a:buClr>
-              <a:buSzPts val="2300"/>
-              <a:buChar char="○"/>
-            </a:pPr>
-            <a:r>
-              <a:rPr lang="en" sz="2300">
-                <a:solidFill>
-                  <a:srgbClr val="F1C232"/>
-                </a:solidFill>
-              </a:rPr>
-              <a:t>What’s in Theaters</a:t>
-            </a:r>
-            <a:endParaRPr sz="2300">
-              <a:solidFill>
-                <a:srgbClr val="F1C232"/>
-              </a:solidFill>
-            </a:endParaRPr>
-          </a:p>
-          <a:p>
-            <a:pPr indent="-374650" lvl="0" marL="457200" rtl="0" algn="l">
-              <a:spcBef>
-                <a:spcPts val="0"/>
-              </a:spcBef>
-              <a:spcAft>
-                <a:spcPts val="0"/>
-              </a:spcAft>
-              <a:buClr>
-                <a:srgbClr val="F1C232"/>
-              </a:buClr>
-              <a:buSzPts val="2300"/>
-              <a:buChar char="●"/>
-            </a:pPr>
-            <a:r>
-              <a:rPr lang="en" sz="2300">
-                <a:solidFill>
-                  <a:srgbClr val="F1C232"/>
-                </a:solidFill>
-              </a:rPr>
-              <a:t>Mark a Movie as a Favorite</a:t>
-            </a:r>
-            <a:endParaRPr sz="2300">
-              <a:solidFill>
-                <a:srgbClr val="F1C232"/>
-              </a:solidFill>
-            </a:endParaRPr>
-          </a:p>
-        </p:txBody>
-      </p:sp>
-    </p:spTree>
-  </p:cSld>
-  <p:clrMapOvr>
-    <a:masterClrMapping/>
-  </p:clrMapOvr>
-</p:sld>
+<file path=ppt/theme/theme1.xml><?xml version="1.0" encoding="utf-8"?>
+<a:theme xmlns:a="http://schemas.openxmlformats.org/drawingml/2006/main" xmlns:r="http://schemas.openxmlformats.org/officeDocument/2006/relationships" name="Simple Dark">
+  <a:themeElements>
+    <a:clrScheme name="Simple Dark">
+      <a:dk1>
+        <a:srgbClr val="FFFFFF"/>
+      </a:dk1>
+      <a:lt1>
+        <a:srgbClr val="212121"/>
+      </a:lt1>
+      <a:dk2>
+        <a:srgbClr val="303030"/>
+      </a:dk2>
+      <a:lt2>
+        <a:srgbClr val="ADADAD"/>
+      </a:lt2>
+      <a:accent1>
+        <a:srgbClr val="009688"/>
+      </a:accent1>
+      <a:accent2>
+        <a:srgbClr val="EEEEEE"/>
+      </a:accent2>
+      <a:accent3>
+        <a:srgbClr val="78909C"/>
+      </a:accent3>
+      <a:accent4>
+        <a:srgbClr val="FFAB40"/>
+      </a:accent4>
+      <a:accent5>
+        <a:srgbClr val="4DD0E1"/>
+      </a:accent5>
+      <a:accent6>
+        <a:srgbClr val="EEFF41"/>
+      </a:accent6>
+      <a:hlink>
+        <a:srgbClr val="4DD0E1"/>
+      </a:hlink>
+      <a:folHlink>
+        <a:srgbClr val="4DD0E1"/>
+      </a:folHlink>
+    </a:clrScheme>
+    <a:fontScheme name="Office">
+      <a:majorFont>
+        <a:latin typeface="Arial"/>
+        <a:ea typeface=""/>
+        <a:cs typeface=""/>
+        <a:font script="Jpan" typeface="ＭＳ Ｐゴシック"/>
+        <a:font script="Hang" typeface="맑은 고딕"/>
+        <a:font script="Hans" typeface="宋体"/>
+        <a:font script="Hant" typeface="新細明體"/>
+        <a:font script="Arab" typeface="Times New Roman"/>
+        <a:font script="Hebr" typeface="Times New Roman"/>
+        <a:font script="Thai" typeface="Angsana New"/>
+        <a:font script="Ethi" typeface="Nyala"/>
+        <a:font script="Beng" typeface="Vrinda"/>
+        <a:font script="Gujr" typeface="Shruti"/>
+        <a:font script="Khmr" typeface="MoolBoran"/>
+        <a:font script="Knda" typeface="Tunga"/>
+        <a:font script="Guru" typeface="Raavi"/>
+        <a:font script="Cans" typeface="Euphemia"/>
+        <a:font script="Cher" typeface="Plantagenet Cherokee"/>
+        <a:font script="Yiii" typeface="Microsoft Yi Baiti"/>
+        <a:font script="Tibt" typeface="Microsoft Himalaya"/>
+        <a:font script="Thaa" typeface="MV Boli"/>
+        <a:font script="Deva" typeface="Mangal"/>
+        <a:font script="Telu" typeface="Gautami"/>
+        <a:font script="Taml" typeface="Latha"/>
+        <a:font script="Syrc" typeface="Estrangelo Edessa"/>
+        <a:font script="Orya" typeface="Kalinga"/>
+        <a:font script="Mlym" typeface="Kartika"/>
+        <a:font script="Laoo" typeface="DokChampa"/>
+        <a:font script="Sinh" typeface="Iskoola Pota"/>
+        <a:font script="Mong" typeface="Mongolian Baiti"/>
+        <a:font script="Viet" typeface="Times New Roman"/>
+        <a:font script="Uigh" typeface="Microsoft Uighur"/>
+        <a:font script="Geor" typeface="Sylfaen"/>
+      </a:majorFont>
+      <a:minorFont>
+        <a:latin typeface="Arial"/>
+        <a:ea typeface=""/>
+        <a:cs typeface=""/>
+        <a:font script="Jpan" typeface="ＭＳ Ｐゴシック"/>
+        <a:font script="Hang" typeface="맑은 고딕"/>
+        <a:font script="Hans" typeface="宋体"/>
+        <a:font script="Hant" typeface="新細明體"/>
+        <a:font script="Arab" typeface="Arial"/>
+        <a:font script="Hebr" typeface="Arial"/>
+        <a:font script="Thai" typeface="Cordia New"/>
+        <a:font script="Ethi" typeface="Nyala"/>
+        <a:font script="Beng" typeface="Vrinda"/>
+        <a:font script="Gujr" typeface="Shruti"/>
+        <a:font script="Khmr" typeface="DaunPenh"/>
+        <a:font script="Knda" typeface="Tunga"/>
+        <a:font script="Guru" typeface="Raavi"/>
+        <a:font script="Cans" typeface="Euphemia"/>
+        <a:font script="Cher" typeface="Plantagenet Cherokee"/>
+        <a:font script="Yiii" typeface="Microsoft Yi Baiti"/>
+        <a:font script="Tibt" typeface="Microsoft Himalaya"/>
+        <a:font script="Thaa" typeface="MV Boli"/>
+        <a:font script="Deva" typeface="Mangal"/>
+        <a:font script="Telu" typeface="Gautami"/>
+        <a:font script="Taml" typeface="Latha"/>
+        <a:font script="Syrc" typeface="Estrangelo Edessa"/>
+        <a:font script="Orya" typeface="Kalinga"/>
+        <a:font script="Mlym" typeface="Kartika"/>
+        <a:font script="Laoo" typeface="DokChampa"/>
+        <a:font script="Sinh" typeface="Iskoola Pota"/>
+        <a:font script="Mong" typeface="Mongolian Baiti"/>
+        <a:font script="Viet" typeface="Arial"/>
+        <a:font script="Uigh" typeface="Microsoft Uighur"/>
+        <a:font script="Geor" typeface="Sylfaen"/>
+      </a:minorFont>
+    </a:fontScheme>
+    <a:fmtScheme name="Office">
+      <a:fillStyleLst>
+        <a:solidFill>
+          <a:schemeClr val="phClr"/>
+        </a:solidFill>
+        <a:gradFill rotWithShape="1">
+          <a:gsLst>
+            <a:gs pos="0">
+              <a:schemeClr val="phClr">
+                <a:tint val="50000"/>
+                <a:satMod val="300000"/>
+              </a:schemeClr>
+            </a:gs>
+            <a:gs pos="35000">
+              <a:schemeClr val="phClr">
+                <a:tint val="37000"/>
+                <a:satMod val="300000"/>
+              </a:schemeClr>
+            </a:gs>
+            <a:gs pos="100000">
+              <a:schemeClr val="phClr">
+                <a:tint val="15000"/>
+                <a:satMod val="350000"/>
+              </a:schemeClr>
+            </a:gs>
+          </a:gsLst>
+          <a:lin ang="16200000" scaled="1"/>
+        </a:gradFill>
+        <a:gradFill rotWithShape="1">
+          <a:gsLst>
+            <a:gs pos="0">
+              <a:schemeClr val="phClr">
+                <a:tint val="100000"/>
+                <a:shade val="100000"/>
+                <a:satMod val="130000"/>
+              </a:schemeClr>
+            </a:gs>
+            <a:gs pos="100000">
+              <a:schemeClr val="phClr">
+                <a:tint val="50000"/>
+                <a:shade val="100000"/>
+                <a:satMod val="350000"/>
+              </a:schemeClr>
+            </a:gs>
+          </a:gsLst>
+          <a:lin ang="16200000" scaled="0"/>
+        </a:gradFill>
+      </a:fillStyleLst>
+      <a:lnStyleLst>
+        <a:ln w="9525" cap="flat" cmpd="sng" algn="ctr">
+          <a:solidFill>
+            <a:schemeClr val="phClr">
+              <a:shade val="95000"/>
+              <a:satMod val="105000"/>
+            </a:schemeClr>
+          </a:solidFill>
+          <a:prstDash val="solid"/>
+        </a:ln>
+        <a:ln w="25400" cap="flat" cmpd="sng" algn="ctr">
+          <a:solidFill>
+            <a:schemeClr val="phClr"/>
+          </a:solidFill>
+          <a:prstDash val="solid"/>
+        </a:ln>
+        <a:ln w="38100" cap="flat" cmpd="sng" algn="ctr">
+          <a:solidFill>
+            <a:schemeClr val="phClr"/>
+          </a:solidFill>
+          <a:prstDash val="solid"/>
+        </a:ln>
+      </a:lnStyleLst>
+      <a:effectStyleLst>
+        <a:effectStyle>
+          <a:effectLst>
+            <a:outerShdw blurRad="40000" dist="20000" dir="5400000" rotWithShape="0">
+              <a:srgbClr val="000000">
+                <a:alpha val="38000"/>
+              </a:srgbClr>
+            </a:outerShdw>
+          </a:effectLst>
+        </a:effectStyle>
+        <a:effectStyle>
+          <a:effectLst>
+            <a:outerShdw blurRad="40000" dist="23000" dir="5400000" rotWithShape="0">
+              <a:srgbClr val="000000">
+                <a:alpha val="35000"/>
+              </a:srgbClr>
+            </a:outerShdw>
+          </a:effectLst>
+        </a:effectStyle>
+        <a:effectStyle>
+          <a:effectLst>
+            <a:outerShdw blurRad="40000" dist="23000" dir="5400000" rotWithShape="0">
+              <a:srgbClr val="000000">
+                <a:alpha val="35000"/>
+              </a:srgbClr>
+            </a:outerShdw>
+          </a:effectLst>
+          <a:scene3d>
+            <a:camera prst="orthographicFront">
+              <a:rot lat="0" lon="0" rev="0"/>
+            </a:camera>
+            <a:lightRig rig="threePt" dir="t">
+              <a:rot lat="0" lon="0" rev="1200000"/>
+            </a:lightRig>
+          </a:scene3d>
+          <a:sp3d>
+            <a:bevelT w="63500" h="25400"/>
+          </a:sp3d>
+        </a:effectStyle>
+      </a:effectStyleLst>
+      <a:bgFillStyleLst>
+        <a:solidFill>
+          <a:schemeClr val="phClr"/>
+        </a:solidFill>
+        <a:gradFill rotWithShape="1">
+          <a:gsLst>
+            <a:gs pos="0">
+              <a:schemeClr val="phClr">
+                <a:tint val="40000"/>
+                <a:satMod val="350000"/>
+              </a:schemeClr>
+            </a:gs>
+            <a:gs pos="40000">
+              <a:schemeClr val="phClr">
+                <a:tint val="45000"/>
+                <a:shade val="99000"/>
+                <a:satMod val="350000"/>
+              </a:schemeClr>
+            </a:gs>
+            <a:gs pos="100000">
+              <a:schemeClr val="phClr">
+                <a:shade val="20000"/>
+                <a:satMod val="255000"/>
+              </a:schemeClr>
+            </a:gs>
+          </a:gsLst>
+          <a:path path="circle">
+            <a:fillToRect l="50000" t="-80000" r="50000" b="180000"/>
+          </a:path>
+        </a:gradFill>
+        <a:gradFill rotWithShape="1">
+          <a:gsLst>
+            <a:gs pos="0">
+              <a:schemeClr val="phClr">
+                <a:tint val="80000"/>
+                <a:satMod val="300000"/>
+              </a:schemeClr>
+            </a:gs>
+            <a:gs pos="100000">
+              <a:schemeClr val="phClr">
+                <a:shade val="30000"/>
+                <a:satMod val="200000"/>
+              </a:schemeClr>
+            </a:gs>
+          </a:gsLst>
+          <a:path path="circle">
+            <a:fillToRect l="50000" t="50000" r="50000" b="50000"/>
+          </a:path>
+        </a:gradFill>
+      </a:bgFillStyleLst>
+    </a:fmtScheme>
+  </a:themeElements>
+</a:theme>
 </file>
 
-<file path=ppt/theme/theme1.xml><?xml version="1.0" encoding="utf-8"?>
+<file path=ppt/theme/theme2.xml><?xml version="1.0" encoding="utf-8"?>
 <a:theme xmlns:a="http://schemas.openxmlformats.org/drawingml/2006/main" xmlns:r="http://schemas.openxmlformats.org/officeDocument/2006/relationships">
   <a:themeElements>
     <a:clrScheme name="Default">
@@ -10671,283 +11540,4 @@
     </a:fmtScheme>
   </a:themeElements>
 </a:theme>
-</file>
-
-<file path=ppt/theme/theme2.xml><?xml version="1.0" encoding="utf-8"?>
-<a:theme xmlns:a="http://schemas.openxmlformats.org/drawingml/2006/main" xmlns:r="http://schemas.openxmlformats.org/officeDocument/2006/relationships" name="Simple Dark">
-  <a:themeElements>
-    <a:clrScheme name="Simple Dark">
-      <a:dk1>
-        <a:srgbClr val="FFFFFF"/>
-      </a:dk1>
-      <a:lt1>
-        <a:srgbClr val="212121"/>
-      </a:lt1>
-      <a:dk2>
-        <a:srgbClr val="303030"/>
-      </a:dk2>
-      <a:lt2>
-        <a:srgbClr val="ADADAD"/>
-      </a:lt2>
-      <a:accent1>
-        <a:srgbClr val="009688"/>
-      </a:accent1>
-      <a:accent2>
-        <a:srgbClr val="EEEEEE"/>
-      </a:accent2>
-      <a:accent3>
-        <a:srgbClr val="78909C"/>
-      </a:accent3>
-      <a:accent4>
-        <a:srgbClr val="FFAB40"/>
-      </a:accent4>
-      <a:accent5>
-        <a:srgbClr val="4DD0E1"/>
-      </a:accent5>
-      <a:accent6>
-        <a:srgbClr val="EEFF41"/>
-      </a:accent6>
-      <a:hlink>
-        <a:srgbClr val="4DD0E1"/>
-      </a:hlink>
-      <a:folHlink>
-        <a:srgbClr val="4DD0E1"/>
-      </a:folHlink>
-    </a:clrScheme>
-    <a:fontScheme name="Office">
-      <a:majorFont>
-        <a:latin typeface="Arial"/>
-        <a:ea typeface=""/>
-        <a:cs typeface=""/>
-        <a:font script="Jpan" typeface="ＭＳ Ｐゴシック"/>
-        <a:font script="Hang" typeface="맑은 고딕"/>
-        <a:font script="Hans" typeface="宋体"/>
-        <a:font script="Hant" typeface="新細明體"/>
-        <a:font script="Arab" typeface="Times New Roman"/>
-        <a:font script="Hebr" typeface="Times New Roman"/>
-        <a:font script="Thai" typeface="Angsana New"/>
-        <a:font script="Ethi" typeface="Nyala"/>
-        <a:font script="Beng" typeface="Vrinda"/>
-        <a:font script="Gujr" typeface="Shruti"/>
-        <a:font script="Khmr" typeface="MoolBoran"/>
-        <a:font script="Knda" typeface="Tunga"/>
-        <a:font script="Guru" typeface="Raavi"/>
-        <a:font script="Cans" typeface="Euphemia"/>
-        <a:font script="Cher" typeface="Plantagenet Cherokee"/>
-        <a:font script="Yiii" typeface="Microsoft Yi Baiti"/>
-        <a:font script="Tibt" typeface="Microsoft Himalaya"/>
-        <a:font script="Thaa" typeface="MV Boli"/>
-        <a:font script="Deva" typeface="Mangal"/>
-        <a:font script="Telu" typeface="Gautami"/>
-        <a:font script="Taml" typeface="Latha"/>
-        <a:font script="Syrc" typeface="Estrangelo Edessa"/>
-        <a:font script="Orya" typeface="Kalinga"/>
-        <a:font script="Mlym" typeface="Kartika"/>
-        <a:font script="Laoo" typeface="DokChampa"/>
-        <a:font script="Sinh" typeface="Iskoola Pota"/>
-        <a:font script="Mong" typeface="Mongolian Baiti"/>
-        <a:font script="Viet" typeface="Times New Roman"/>
-        <a:font script="Uigh" typeface="Microsoft Uighur"/>
-        <a:font script="Geor" typeface="Sylfaen"/>
-      </a:majorFont>
-      <a:minorFont>
-        <a:latin typeface="Arial"/>
-        <a:ea typeface=""/>
-        <a:cs typeface=""/>
-        <a:font script="Jpan" typeface="ＭＳ Ｐゴシック"/>
-        <a:font script="Hang" typeface="맑은 고딕"/>
-        <a:font script="Hans" typeface="宋体"/>
-        <a:font script="Hant" typeface="新細明體"/>
-        <a:font script="Arab" typeface="Arial"/>
-        <a:font script="Hebr" typeface="Arial"/>
-        <a:font script="Thai" typeface="Cordia New"/>
-        <a:font script="Ethi" typeface="Nyala"/>
-        <a:font script="Beng" typeface="Vrinda"/>
-        <a:font script="Gujr" typeface="Shruti"/>
-        <a:font script="Khmr" typeface="DaunPenh"/>
-        <a:font script="Knda" typeface="Tunga"/>
-        <a:font script="Guru" typeface="Raavi"/>
-        <a:font script="Cans" typeface="Euphemia"/>
-        <a:font script="Cher" typeface="Plantagenet Cherokee"/>
-        <a:font script="Yiii" typeface="Microsoft Yi Baiti"/>
-        <a:font script="Tibt" typeface="Microsoft Himalaya"/>
-        <a:font script="Thaa" typeface="MV Boli"/>
-        <a:font script="Deva" typeface="Mangal"/>
-        <a:font script="Telu" typeface="Gautami"/>
-        <a:font script="Taml" typeface="Latha"/>
-        <a:font script="Syrc" typeface="Estrangelo Edessa"/>
-        <a:font script="Orya" typeface="Kalinga"/>
-        <a:font script="Mlym" typeface="Kartika"/>
-        <a:font script="Laoo" typeface="DokChampa"/>
-        <a:font script="Sinh" typeface="Iskoola Pota"/>
-        <a:font script="Mong" typeface="Mongolian Baiti"/>
-        <a:font script="Viet" typeface="Arial"/>
-        <a:font script="Uigh" typeface="Microsoft Uighur"/>
-        <a:font script="Geor" typeface="Sylfaen"/>
-      </a:minorFont>
-    </a:fontScheme>
-    <a:fmtScheme name="Office">
-      <a:fillStyleLst>
-        <a:solidFill>
-          <a:schemeClr val="phClr"/>
-        </a:solidFill>
-        <a:gradFill rotWithShape="1">
-          <a:gsLst>
-            <a:gs pos="0">
-              <a:schemeClr val="phClr">
-                <a:tint val="50000"/>
-                <a:satMod val="300000"/>
-              </a:schemeClr>
-            </a:gs>
-            <a:gs pos="35000">
-              <a:schemeClr val="phClr">
-                <a:tint val="37000"/>
-                <a:satMod val="300000"/>
-              </a:schemeClr>
-            </a:gs>
-            <a:gs pos="100000">
-              <a:schemeClr val="phClr">
-                <a:tint val="15000"/>
-                <a:satMod val="350000"/>
-              </a:schemeClr>
-            </a:gs>
-          </a:gsLst>
-          <a:lin ang="16200000" scaled="1"/>
-        </a:gradFill>
-        <a:gradFill rotWithShape="1">
-          <a:gsLst>
-            <a:gs pos="0">
-              <a:schemeClr val="phClr">
-                <a:tint val="100000"/>
-                <a:shade val="100000"/>
-                <a:satMod val="130000"/>
-              </a:schemeClr>
-            </a:gs>
-            <a:gs pos="100000">
-              <a:schemeClr val="phClr">
-                <a:tint val="50000"/>
-                <a:shade val="100000"/>
-                <a:satMod val="350000"/>
-              </a:schemeClr>
-            </a:gs>
-          </a:gsLst>
-          <a:lin ang="16200000" scaled="0"/>
-        </a:gradFill>
-      </a:fillStyleLst>
-      <a:lnStyleLst>
-        <a:ln w="9525" cap="flat" cmpd="sng" algn="ctr">
-          <a:solidFill>
-            <a:schemeClr val="phClr">
-              <a:shade val="95000"/>
-              <a:satMod val="105000"/>
-            </a:schemeClr>
-          </a:solidFill>
-          <a:prstDash val="solid"/>
-        </a:ln>
-        <a:ln w="25400" cap="flat" cmpd="sng" algn="ctr">
-          <a:solidFill>
-            <a:schemeClr val="phClr"/>
-          </a:solidFill>
-          <a:prstDash val="solid"/>
-        </a:ln>
-        <a:ln w="38100" cap="flat" cmpd="sng" algn="ctr">
-          <a:solidFill>
-            <a:schemeClr val="phClr"/>
-          </a:solidFill>
-          <a:prstDash val="solid"/>
-        </a:ln>
-      </a:lnStyleLst>
-      <a:effectStyleLst>
-        <a:effectStyle>
-          <a:effectLst>
-            <a:outerShdw blurRad="40000" dist="20000" dir="5400000" rotWithShape="0">
-              <a:srgbClr val="000000">
-                <a:alpha val="38000"/>
-              </a:srgbClr>
-            </a:outerShdw>
-          </a:effectLst>
-        </a:effectStyle>
-        <a:effectStyle>
-          <a:effectLst>
-            <a:outerShdw blurRad="40000" dist="23000" dir="5400000" rotWithShape="0">
-              <a:srgbClr val="000000">
-                <a:alpha val="35000"/>
-              </a:srgbClr>
-            </a:outerShdw>
-          </a:effectLst>
-        </a:effectStyle>
-        <a:effectStyle>
-          <a:effectLst>
-            <a:outerShdw blurRad="40000" dist="23000" dir="5400000" rotWithShape="0">
-              <a:srgbClr val="000000">
-                <a:alpha val="35000"/>
-              </a:srgbClr>
-            </a:outerShdw>
-          </a:effectLst>
-          <a:scene3d>
-            <a:camera prst="orthographicFront">
-              <a:rot lat="0" lon="0" rev="0"/>
-            </a:camera>
-            <a:lightRig rig="threePt" dir="t">
-              <a:rot lat="0" lon="0" rev="1200000"/>
-            </a:lightRig>
-          </a:scene3d>
-          <a:sp3d>
-            <a:bevelT w="63500" h="25400"/>
-          </a:sp3d>
-        </a:effectStyle>
-      </a:effectStyleLst>
-      <a:bgFillStyleLst>
-        <a:solidFill>
-          <a:schemeClr val="phClr"/>
-        </a:solidFill>
-        <a:gradFill rotWithShape="1">
-          <a:gsLst>
-            <a:gs pos="0">
-              <a:schemeClr val="phClr">
-                <a:tint val="40000"/>
-                <a:satMod val="350000"/>
-              </a:schemeClr>
-            </a:gs>
-            <a:gs pos="40000">
-              <a:schemeClr val="phClr">
-                <a:tint val="45000"/>
-                <a:shade val="99000"/>
-                <a:satMod val="350000"/>
-              </a:schemeClr>
-            </a:gs>
-            <a:gs pos="100000">
-              <a:schemeClr val="phClr">
-                <a:shade val="20000"/>
-                <a:satMod val="255000"/>
-              </a:schemeClr>
-            </a:gs>
-          </a:gsLst>
-          <a:path path="circle">
-            <a:fillToRect l="50000" t="-80000" r="50000" b="180000"/>
-          </a:path>
-        </a:gradFill>
-        <a:gradFill rotWithShape="1">
-          <a:gsLst>
-            <a:gs pos="0">
-              <a:schemeClr val="phClr">
-                <a:tint val="80000"/>
-                <a:satMod val="300000"/>
-              </a:schemeClr>
-            </a:gs>
-            <a:gs pos="100000">
-              <a:schemeClr val="phClr">
-                <a:shade val="30000"/>
-                <a:satMod val="200000"/>
-              </a:schemeClr>
-            </a:gs>
-          </a:gsLst>
-          <a:path path="circle">
-            <a:fillToRect l="50000" t="50000" r="50000" b="50000"/>
-          </a:path>
-        </a:gradFill>
-      </a:bgFillStyleLst>
-    </a:fmtScheme>
-  </a:themeElements>
-</a:theme>
 </file>
</xml_diff>